<commit_message>
re-rooted nl63 on outgroup
</commit_message>
<xml_diff>
--- a/antigenic_evolution/plots/figures/figure1.pptx
+++ b/antigenic_evolution/plots/figures/figure1.pptx
@@ -2,12 +2,12 @@
 <file path=ppt/presentation.xml><?xml version="1.0" encoding="utf-8"?>
 <p:presentation xmlns:a="http://schemas.openxmlformats.org/drawingml/2006/main" xmlns:r="http://schemas.openxmlformats.org/officeDocument/2006/relationships" xmlns:p="http://schemas.openxmlformats.org/presentationml/2006/main" saveSubsetFonts="1" autoCompressPictures="0">
   <p:sldMasterIdLst>
-    <p:sldMasterId id="2147483672" r:id="rId1"/>
+    <p:sldMasterId id="2147483660" r:id="rId1"/>
   </p:sldMasterIdLst>
   <p:sldIdLst>
     <p:sldId id="256" r:id="rId2"/>
   </p:sldIdLst>
-  <p:sldSz cx="13030200" cy="6858000"/>
+  <p:sldSz cx="12192000" cy="6629400"/>
   <p:notesSz cx="6858000" cy="9144000"/>
   <p:defaultTextStyle>
     <a:defPPr>
@@ -136,15 +136,15 @@
         </p:nvSpPr>
         <p:spPr>
           <a:xfrm>
-            <a:off x="1628775" y="1122363"/>
-            <a:ext cx="9772650" cy="2387600"/>
+            <a:off x="1524000" y="1084951"/>
+            <a:ext cx="9144000" cy="2308013"/>
           </a:xfrm>
         </p:spPr>
         <p:txBody>
           <a:bodyPr anchor="b"/>
           <a:lstStyle>
             <a:lvl1pPr algn="ctr">
-              <a:defRPr sz="6000"/>
+              <a:defRPr sz="5800"/>
             </a:lvl1pPr>
           </a:lstStyle>
           <a:p>
@@ -168,8 +168,8 @@
         </p:nvSpPr>
         <p:spPr>
           <a:xfrm>
-            <a:off x="1628775" y="3602038"/>
-            <a:ext cx="9772650" cy="1655762"/>
+            <a:off x="1524000" y="3481970"/>
+            <a:ext cx="9144000" cy="1600570"/>
           </a:xfrm>
         </p:spPr>
         <p:txBody>
@@ -177,39 +177,39 @@
           <a:lstStyle>
             <a:lvl1pPr marL="0" indent="0" algn="ctr">
               <a:buNone/>
-              <a:defRPr sz="2400"/>
+              <a:defRPr sz="2320"/>
             </a:lvl1pPr>
-            <a:lvl2pPr marL="457200" indent="0" algn="ctr">
-              <a:buNone/>
-              <a:defRPr sz="2000"/>
+            <a:lvl2pPr marL="441975" indent="0" algn="ctr">
+              <a:buNone/>
+              <a:defRPr sz="1933"/>
             </a:lvl2pPr>
-            <a:lvl3pPr marL="914400" indent="0" algn="ctr">
-              <a:buNone/>
-              <a:defRPr sz="1800"/>
+            <a:lvl3pPr marL="883950" indent="0" algn="ctr">
+              <a:buNone/>
+              <a:defRPr sz="1740"/>
             </a:lvl3pPr>
-            <a:lvl4pPr marL="1371600" indent="0" algn="ctr">
-              <a:buNone/>
-              <a:defRPr sz="1600"/>
+            <a:lvl4pPr marL="1325926" indent="0" algn="ctr">
+              <a:buNone/>
+              <a:defRPr sz="1547"/>
             </a:lvl4pPr>
-            <a:lvl5pPr marL="1828800" indent="0" algn="ctr">
-              <a:buNone/>
-              <a:defRPr sz="1600"/>
+            <a:lvl5pPr marL="1767901" indent="0" algn="ctr">
+              <a:buNone/>
+              <a:defRPr sz="1547"/>
             </a:lvl5pPr>
-            <a:lvl6pPr marL="2286000" indent="0" algn="ctr">
-              <a:buNone/>
-              <a:defRPr sz="1600"/>
+            <a:lvl6pPr marL="2209876" indent="0" algn="ctr">
+              <a:buNone/>
+              <a:defRPr sz="1547"/>
             </a:lvl6pPr>
-            <a:lvl7pPr marL="2743200" indent="0" algn="ctr">
-              <a:buNone/>
-              <a:defRPr sz="1600"/>
+            <a:lvl7pPr marL="2651851" indent="0" algn="ctr">
+              <a:buNone/>
+              <a:defRPr sz="1547"/>
             </a:lvl7pPr>
-            <a:lvl8pPr marL="3200400" indent="0" algn="ctr">
-              <a:buNone/>
-              <a:defRPr sz="1600"/>
+            <a:lvl8pPr marL="3093827" indent="0" algn="ctr">
+              <a:buNone/>
+              <a:defRPr sz="1547"/>
             </a:lvl8pPr>
-            <a:lvl9pPr marL="3657600" indent="0" algn="ctr">
-              <a:buNone/>
-              <a:defRPr sz="1600"/>
+            <a:lvl9pPr marL="3535802" indent="0" algn="ctr">
+              <a:buNone/>
+              <a:defRPr sz="1547"/>
             </a:lvl9pPr>
           </a:lstStyle>
           <a:p>
@@ -236,9 +236,9 @@
           <a:bodyPr/>
           <a:lstStyle/>
           <a:p>
-            <a:fld id="{961B3E00-272A-CB49-9436-792A2B80BC36}" type="datetimeFigureOut">
+            <a:fld id="{58749126-4A29-7841-A2CD-BCBFE668F1B2}" type="datetimeFigureOut">
               <a:rPr lang="en-US" smtClean="0"/>
-              <a:t>9/16/20</a:t>
+              <a:t>9/30/20</a:t>
             </a:fld>
             <a:endParaRPr lang="en-US"/>
           </a:p>
@@ -278,7 +278,7 @@
           <a:bodyPr/>
           <a:lstStyle/>
           <a:p>
-            <a:fld id="{FF55A60A-9CF8-9E43-BD62-1B7BCFCE8BC3}" type="slidenum">
+            <a:fld id="{7B5027D2-4F26-8245-9719-1C4CDD60CB74}" type="slidenum">
               <a:rPr lang="en-US" smtClean="0"/>
               <a:t>‹#›</a:t>
             </a:fld>
@@ -289,7 +289,7 @@
     </p:spTree>
     <p:extLst>
       <p:ext uri="{BB962C8B-B14F-4D97-AF65-F5344CB8AC3E}">
-        <p14:creationId xmlns:p14="http://schemas.microsoft.com/office/powerpoint/2010/main" val="2653013205"/>
+        <p14:creationId xmlns:p14="http://schemas.microsoft.com/office/powerpoint/2010/main" val="243427947"/>
       </p:ext>
     </p:extLst>
   </p:cSld>
@@ -406,9 +406,9 @@
           <a:bodyPr/>
           <a:lstStyle/>
           <a:p>
-            <a:fld id="{961B3E00-272A-CB49-9436-792A2B80BC36}" type="datetimeFigureOut">
+            <a:fld id="{58749126-4A29-7841-A2CD-BCBFE668F1B2}" type="datetimeFigureOut">
               <a:rPr lang="en-US" smtClean="0"/>
-              <a:t>9/16/20</a:t>
+              <a:t>9/30/20</a:t>
             </a:fld>
             <a:endParaRPr lang="en-US"/>
           </a:p>
@@ -448,7 +448,7 @@
           <a:bodyPr/>
           <a:lstStyle/>
           <a:p>
-            <a:fld id="{FF55A60A-9CF8-9E43-BD62-1B7BCFCE8BC3}" type="slidenum">
+            <a:fld id="{7B5027D2-4F26-8245-9719-1C4CDD60CB74}" type="slidenum">
               <a:rPr lang="en-US" smtClean="0"/>
               <a:t>‹#›</a:t>
             </a:fld>
@@ -459,7 +459,7 @@
     </p:spTree>
     <p:extLst>
       <p:ext uri="{BB962C8B-B14F-4D97-AF65-F5344CB8AC3E}">
-        <p14:creationId xmlns:p14="http://schemas.microsoft.com/office/powerpoint/2010/main" val="4241721147"/>
+        <p14:creationId xmlns:p14="http://schemas.microsoft.com/office/powerpoint/2010/main" val="1319574698"/>
       </p:ext>
     </p:extLst>
   </p:cSld>
@@ -498,8 +498,8 @@
         </p:nvSpPr>
         <p:spPr>
           <a:xfrm>
-            <a:off x="9324737" y="365125"/>
-            <a:ext cx="2809637" cy="5811838"/>
+            <a:off x="8724900" y="352954"/>
+            <a:ext cx="2628900" cy="5618110"/>
           </a:xfrm>
         </p:spPr>
         <p:txBody>
@@ -526,8 +526,8 @@
         </p:nvSpPr>
         <p:spPr>
           <a:xfrm>
-            <a:off x="895826" y="365125"/>
-            <a:ext cx="8266033" cy="5811838"/>
+            <a:off x="838200" y="352954"/>
+            <a:ext cx="7734300" cy="5618110"/>
           </a:xfrm>
         </p:spPr>
         <p:txBody>
@@ -586,9 +586,9 @@
           <a:bodyPr/>
           <a:lstStyle/>
           <a:p>
-            <a:fld id="{961B3E00-272A-CB49-9436-792A2B80BC36}" type="datetimeFigureOut">
+            <a:fld id="{58749126-4A29-7841-A2CD-BCBFE668F1B2}" type="datetimeFigureOut">
               <a:rPr lang="en-US" smtClean="0"/>
-              <a:t>9/16/20</a:t>
+              <a:t>9/30/20</a:t>
             </a:fld>
             <a:endParaRPr lang="en-US"/>
           </a:p>
@@ -628,7 +628,7 @@
           <a:bodyPr/>
           <a:lstStyle/>
           <a:p>
-            <a:fld id="{FF55A60A-9CF8-9E43-BD62-1B7BCFCE8BC3}" type="slidenum">
+            <a:fld id="{7B5027D2-4F26-8245-9719-1C4CDD60CB74}" type="slidenum">
               <a:rPr lang="en-US" smtClean="0"/>
               <a:t>‹#›</a:t>
             </a:fld>
@@ -639,7 +639,7 @@
     </p:spTree>
     <p:extLst>
       <p:ext uri="{BB962C8B-B14F-4D97-AF65-F5344CB8AC3E}">
-        <p14:creationId xmlns:p14="http://schemas.microsoft.com/office/powerpoint/2010/main" val="1162757254"/>
+        <p14:creationId xmlns:p14="http://schemas.microsoft.com/office/powerpoint/2010/main" val="83780902"/>
       </p:ext>
     </p:extLst>
   </p:cSld>
@@ -756,9 +756,9 @@
           <a:bodyPr/>
           <a:lstStyle/>
           <a:p>
-            <a:fld id="{961B3E00-272A-CB49-9436-792A2B80BC36}" type="datetimeFigureOut">
+            <a:fld id="{58749126-4A29-7841-A2CD-BCBFE668F1B2}" type="datetimeFigureOut">
               <a:rPr lang="en-US" smtClean="0"/>
-              <a:t>9/16/20</a:t>
+              <a:t>9/30/20</a:t>
             </a:fld>
             <a:endParaRPr lang="en-US"/>
           </a:p>
@@ -798,7 +798,7 @@
           <a:bodyPr/>
           <a:lstStyle/>
           <a:p>
-            <a:fld id="{FF55A60A-9CF8-9E43-BD62-1B7BCFCE8BC3}" type="slidenum">
+            <a:fld id="{7B5027D2-4F26-8245-9719-1C4CDD60CB74}" type="slidenum">
               <a:rPr lang="en-US" smtClean="0"/>
               <a:t>‹#›</a:t>
             </a:fld>
@@ -809,7 +809,7 @@
     </p:spTree>
     <p:extLst>
       <p:ext uri="{BB962C8B-B14F-4D97-AF65-F5344CB8AC3E}">
-        <p14:creationId xmlns:p14="http://schemas.microsoft.com/office/powerpoint/2010/main" val="1607535534"/>
+        <p14:creationId xmlns:p14="http://schemas.microsoft.com/office/powerpoint/2010/main" val="464410527"/>
       </p:ext>
     </p:extLst>
   </p:cSld>
@@ -848,15 +848,15 @@
         </p:nvSpPr>
         <p:spPr>
           <a:xfrm>
-            <a:off x="889039" y="1709739"/>
-            <a:ext cx="11238548" cy="2852737"/>
+            <a:off x="831850" y="1652747"/>
+            <a:ext cx="10515600" cy="2757646"/>
           </a:xfrm>
         </p:spPr>
         <p:txBody>
           <a:bodyPr anchor="b"/>
           <a:lstStyle>
             <a:lvl1pPr>
-              <a:defRPr sz="6000"/>
+              <a:defRPr sz="5800"/>
             </a:lvl1pPr>
           </a:lstStyle>
           <a:p>
@@ -880,8 +880,8 @@
         </p:nvSpPr>
         <p:spPr>
           <a:xfrm>
-            <a:off x="889039" y="4589464"/>
-            <a:ext cx="11238548" cy="1500187"/>
+            <a:off x="831850" y="4436481"/>
+            <a:ext cx="10515600" cy="1450181"/>
           </a:xfrm>
         </p:spPr>
         <p:txBody>
@@ -889,7 +889,7 @@
           <a:lstStyle>
             <a:lvl1pPr marL="0" indent="0">
               <a:buNone/>
-              <a:defRPr sz="2400">
+              <a:defRPr sz="2320">
                 <a:solidFill>
                   <a:schemeClr val="tx1">
                     <a:tint val="75000"/>
@@ -897,9 +897,9 @@
                 </a:solidFill>
               </a:defRPr>
             </a:lvl1pPr>
-            <a:lvl2pPr marL="457200" indent="0">
-              <a:buNone/>
-              <a:defRPr sz="2000">
+            <a:lvl2pPr marL="441975" indent="0">
+              <a:buNone/>
+              <a:defRPr sz="1933">
                 <a:solidFill>
                   <a:schemeClr val="tx1">
                     <a:tint val="75000"/>
@@ -907,9 +907,9 @@
                 </a:solidFill>
               </a:defRPr>
             </a:lvl2pPr>
-            <a:lvl3pPr marL="914400" indent="0">
-              <a:buNone/>
-              <a:defRPr sz="1800">
+            <a:lvl3pPr marL="883950" indent="0">
+              <a:buNone/>
+              <a:defRPr sz="1740">
                 <a:solidFill>
                   <a:schemeClr val="tx1">
                     <a:tint val="75000"/>
@@ -917,9 +917,9 @@
                 </a:solidFill>
               </a:defRPr>
             </a:lvl3pPr>
-            <a:lvl4pPr marL="1371600" indent="0">
-              <a:buNone/>
-              <a:defRPr sz="1600">
+            <a:lvl4pPr marL="1325926" indent="0">
+              <a:buNone/>
+              <a:defRPr sz="1547">
                 <a:solidFill>
                   <a:schemeClr val="tx1">
                     <a:tint val="75000"/>
@@ -927,9 +927,9 @@
                 </a:solidFill>
               </a:defRPr>
             </a:lvl4pPr>
-            <a:lvl5pPr marL="1828800" indent="0">
-              <a:buNone/>
-              <a:defRPr sz="1600">
+            <a:lvl5pPr marL="1767901" indent="0">
+              <a:buNone/>
+              <a:defRPr sz="1547">
                 <a:solidFill>
                   <a:schemeClr val="tx1">
                     <a:tint val="75000"/>
@@ -937,9 +937,9 @@
                 </a:solidFill>
               </a:defRPr>
             </a:lvl5pPr>
-            <a:lvl6pPr marL="2286000" indent="0">
-              <a:buNone/>
-              <a:defRPr sz="1600">
+            <a:lvl6pPr marL="2209876" indent="0">
+              <a:buNone/>
+              <a:defRPr sz="1547">
                 <a:solidFill>
                   <a:schemeClr val="tx1">
                     <a:tint val="75000"/>
@@ -947,9 +947,9 @@
                 </a:solidFill>
               </a:defRPr>
             </a:lvl6pPr>
-            <a:lvl7pPr marL="2743200" indent="0">
-              <a:buNone/>
-              <a:defRPr sz="1600">
+            <a:lvl7pPr marL="2651851" indent="0">
+              <a:buNone/>
+              <a:defRPr sz="1547">
                 <a:solidFill>
                   <a:schemeClr val="tx1">
                     <a:tint val="75000"/>
@@ -957,9 +957,9 @@
                 </a:solidFill>
               </a:defRPr>
             </a:lvl7pPr>
-            <a:lvl8pPr marL="3200400" indent="0">
-              <a:buNone/>
-              <a:defRPr sz="1600">
+            <a:lvl8pPr marL="3093827" indent="0">
+              <a:buNone/>
+              <a:defRPr sz="1547">
                 <a:solidFill>
                   <a:schemeClr val="tx1">
                     <a:tint val="75000"/>
@@ -967,9 +967,9 @@
                 </a:solidFill>
               </a:defRPr>
             </a:lvl8pPr>
-            <a:lvl9pPr marL="3657600" indent="0">
-              <a:buNone/>
-              <a:defRPr sz="1600">
+            <a:lvl9pPr marL="3535802" indent="0">
+              <a:buNone/>
+              <a:defRPr sz="1547">
                 <a:solidFill>
                   <a:schemeClr val="tx1">
                     <a:tint val="75000"/>
@@ -1002,9 +1002,9 @@
           <a:bodyPr/>
           <a:lstStyle/>
           <a:p>
-            <a:fld id="{961B3E00-272A-CB49-9436-792A2B80BC36}" type="datetimeFigureOut">
+            <a:fld id="{58749126-4A29-7841-A2CD-BCBFE668F1B2}" type="datetimeFigureOut">
               <a:rPr lang="en-US" smtClean="0"/>
-              <a:t>9/16/20</a:t>
+              <a:t>9/30/20</a:t>
             </a:fld>
             <a:endParaRPr lang="en-US"/>
           </a:p>
@@ -1044,7 +1044,7 @@
           <a:bodyPr/>
           <a:lstStyle/>
           <a:p>
-            <a:fld id="{FF55A60A-9CF8-9E43-BD62-1B7BCFCE8BC3}" type="slidenum">
+            <a:fld id="{7B5027D2-4F26-8245-9719-1C4CDD60CB74}" type="slidenum">
               <a:rPr lang="en-US" smtClean="0"/>
               <a:t>‹#›</a:t>
             </a:fld>
@@ -1055,7 +1055,7 @@
     </p:spTree>
     <p:extLst>
       <p:ext uri="{BB962C8B-B14F-4D97-AF65-F5344CB8AC3E}">
-        <p14:creationId xmlns:p14="http://schemas.microsoft.com/office/powerpoint/2010/main" val="3887604079"/>
+        <p14:creationId xmlns:p14="http://schemas.microsoft.com/office/powerpoint/2010/main" val="4240031659"/>
       </p:ext>
     </p:extLst>
   </p:cSld>
@@ -1117,8 +1117,8 @@
         </p:nvSpPr>
         <p:spPr>
           <a:xfrm>
-            <a:off x="895826" y="1825625"/>
-            <a:ext cx="5537835" cy="4351338"/>
+            <a:off x="838200" y="1764771"/>
+            <a:ext cx="5181600" cy="4206293"/>
           </a:xfrm>
         </p:spPr>
         <p:txBody>
@@ -1174,8 +1174,8 @@
         </p:nvSpPr>
         <p:spPr>
           <a:xfrm>
-            <a:off x="6596539" y="1825625"/>
-            <a:ext cx="5537835" cy="4351338"/>
+            <a:off x="6172200" y="1764771"/>
+            <a:ext cx="5181600" cy="4206293"/>
           </a:xfrm>
         </p:spPr>
         <p:txBody>
@@ -1234,9 +1234,9 @@
           <a:bodyPr/>
           <a:lstStyle/>
           <a:p>
-            <a:fld id="{961B3E00-272A-CB49-9436-792A2B80BC36}" type="datetimeFigureOut">
+            <a:fld id="{58749126-4A29-7841-A2CD-BCBFE668F1B2}" type="datetimeFigureOut">
               <a:rPr lang="en-US" smtClean="0"/>
-              <a:t>9/16/20</a:t>
+              <a:t>9/30/20</a:t>
             </a:fld>
             <a:endParaRPr lang="en-US"/>
           </a:p>
@@ -1276,7 +1276,7 @@
           <a:bodyPr/>
           <a:lstStyle/>
           <a:p>
-            <a:fld id="{FF55A60A-9CF8-9E43-BD62-1B7BCFCE8BC3}" type="slidenum">
+            <a:fld id="{7B5027D2-4F26-8245-9719-1C4CDD60CB74}" type="slidenum">
               <a:rPr lang="en-US" smtClean="0"/>
               <a:t>‹#›</a:t>
             </a:fld>
@@ -1287,7 +1287,7 @@
     </p:spTree>
     <p:extLst>
       <p:ext uri="{BB962C8B-B14F-4D97-AF65-F5344CB8AC3E}">
-        <p14:creationId xmlns:p14="http://schemas.microsoft.com/office/powerpoint/2010/main" val="2295810056"/>
+        <p14:creationId xmlns:p14="http://schemas.microsoft.com/office/powerpoint/2010/main" val="3948098449"/>
       </p:ext>
     </p:extLst>
   </p:cSld>
@@ -1326,8 +1326,8 @@
         </p:nvSpPr>
         <p:spPr>
           <a:xfrm>
-            <a:off x="897523" y="365126"/>
-            <a:ext cx="11238548" cy="1325563"/>
+            <a:off x="839788" y="352954"/>
+            <a:ext cx="10515600" cy="1281378"/>
           </a:xfrm>
         </p:spPr>
         <p:txBody>
@@ -1354,8 +1354,8 @@
         </p:nvSpPr>
         <p:spPr>
           <a:xfrm>
-            <a:off x="897524" y="1681163"/>
-            <a:ext cx="5512385" cy="823912"/>
+            <a:off x="839789" y="1625124"/>
+            <a:ext cx="5157787" cy="796448"/>
           </a:xfrm>
         </p:spPr>
         <p:txBody>
@@ -1363,39 +1363,39 @@
           <a:lstStyle>
             <a:lvl1pPr marL="0" indent="0">
               <a:buNone/>
-              <a:defRPr sz="2400" b="1"/>
+              <a:defRPr sz="2320" b="1"/>
             </a:lvl1pPr>
-            <a:lvl2pPr marL="457200" indent="0">
-              <a:buNone/>
-              <a:defRPr sz="2000" b="1"/>
+            <a:lvl2pPr marL="441975" indent="0">
+              <a:buNone/>
+              <a:defRPr sz="1933" b="1"/>
             </a:lvl2pPr>
-            <a:lvl3pPr marL="914400" indent="0">
-              <a:buNone/>
-              <a:defRPr sz="1800" b="1"/>
+            <a:lvl3pPr marL="883950" indent="0">
+              <a:buNone/>
+              <a:defRPr sz="1740" b="1"/>
             </a:lvl3pPr>
-            <a:lvl4pPr marL="1371600" indent="0">
-              <a:buNone/>
-              <a:defRPr sz="1600" b="1"/>
+            <a:lvl4pPr marL="1325926" indent="0">
+              <a:buNone/>
+              <a:defRPr sz="1547" b="1"/>
             </a:lvl4pPr>
-            <a:lvl5pPr marL="1828800" indent="0">
-              <a:buNone/>
-              <a:defRPr sz="1600" b="1"/>
+            <a:lvl5pPr marL="1767901" indent="0">
+              <a:buNone/>
+              <a:defRPr sz="1547" b="1"/>
             </a:lvl5pPr>
-            <a:lvl6pPr marL="2286000" indent="0">
-              <a:buNone/>
-              <a:defRPr sz="1600" b="1"/>
+            <a:lvl6pPr marL="2209876" indent="0">
+              <a:buNone/>
+              <a:defRPr sz="1547" b="1"/>
             </a:lvl6pPr>
-            <a:lvl7pPr marL="2743200" indent="0">
-              <a:buNone/>
-              <a:defRPr sz="1600" b="1"/>
+            <a:lvl7pPr marL="2651851" indent="0">
+              <a:buNone/>
+              <a:defRPr sz="1547" b="1"/>
             </a:lvl7pPr>
-            <a:lvl8pPr marL="3200400" indent="0">
-              <a:buNone/>
-              <a:defRPr sz="1600" b="1"/>
+            <a:lvl8pPr marL="3093827" indent="0">
+              <a:buNone/>
+              <a:defRPr sz="1547" b="1"/>
             </a:lvl8pPr>
-            <a:lvl9pPr marL="3657600" indent="0">
-              <a:buNone/>
-              <a:defRPr sz="1600" b="1"/>
+            <a:lvl9pPr marL="3535802" indent="0">
+              <a:buNone/>
+              <a:defRPr sz="1547" b="1"/>
             </a:lvl9pPr>
           </a:lstStyle>
           <a:p>
@@ -1419,8 +1419,8 @@
         </p:nvSpPr>
         <p:spPr>
           <a:xfrm>
-            <a:off x="897524" y="2505075"/>
-            <a:ext cx="5512385" cy="3684588"/>
+            <a:off x="839789" y="2421573"/>
+            <a:ext cx="5157787" cy="3561768"/>
           </a:xfrm>
         </p:spPr>
         <p:txBody>
@@ -1476,8 +1476,8 @@
         </p:nvSpPr>
         <p:spPr>
           <a:xfrm>
-            <a:off x="6596539" y="1681163"/>
-            <a:ext cx="5539532" cy="823912"/>
+            <a:off x="6172200" y="1625124"/>
+            <a:ext cx="5183188" cy="796448"/>
           </a:xfrm>
         </p:spPr>
         <p:txBody>
@@ -1485,39 +1485,39 @@
           <a:lstStyle>
             <a:lvl1pPr marL="0" indent="0">
               <a:buNone/>
-              <a:defRPr sz="2400" b="1"/>
+              <a:defRPr sz="2320" b="1"/>
             </a:lvl1pPr>
-            <a:lvl2pPr marL="457200" indent="0">
-              <a:buNone/>
-              <a:defRPr sz="2000" b="1"/>
+            <a:lvl2pPr marL="441975" indent="0">
+              <a:buNone/>
+              <a:defRPr sz="1933" b="1"/>
             </a:lvl2pPr>
-            <a:lvl3pPr marL="914400" indent="0">
-              <a:buNone/>
-              <a:defRPr sz="1800" b="1"/>
+            <a:lvl3pPr marL="883950" indent="0">
+              <a:buNone/>
+              <a:defRPr sz="1740" b="1"/>
             </a:lvl3pPr>
-            <a:lvl4pPr marL="1371600" indent="0">
-              <a:buNone/>
-              <a:defRPr sz="1600" b="1"/>
+            <a:lvl4pPr marL="1325926" indent="0">
+              <a:buNone/>
+              <a:defRPr sz="1547" b="1"/>
             </a:lvl4pPr>
-            <a:lvl5pPr marL="1828800" indent="0">
-              <a:buNone/>
-              <a:defRPr sz="1600" b="1"/>
+            <a:lvl5pPr marL="1767901" indent="0">
+              <a:buNone/>
+              <a:defRPr sz="1547" b="1"/>
             </a:lvl5pPr>
-            <a:lvl6pPr marL="2286000" indent="0">
-              <a:buNone/>
-              <a:defRPr sz="1600" b="1"/>
+            <a:lvl6pPr marL="2209876" indent="0">
+              <a:buNone/>
+              <a:defRPr sz="1547" b="1"/>
             </a:lvl6pPr>
-            <a:lvl7pPr marL="2743200" indent="0">
-              <a:buNone/>
-              <a:defRPr sz="1600" b="1"/>
+            <a:lvl7pPr marL="2651851" indent="0">
+              <a:buNone/>
+              <a:defRPr sz="1547" b="1"/>
             </a:lvl7pPr>
-            <a:lvl8pPr marL="3200400" indent="0">
-              <a:buNone/>
-              <a:defRPr sz="1600" b="1"/>
+            <a:lvl8pPr marL="3093827" indent="0">
+              <a:buNone/>
+              <a:defRPr sz="1547" b="1"/>
             </a:lvl8pPr>
-            <a:lvl9pPr marL="3657600" indent="0">
-              <a:buNone/>
-              <a:defRPr sz="1600" b="1"/>
+            <a:lvl9pPr marL="3535802" indent="0">
+              <a:buNone/>
+              <a:defRPr sz="1547" b="1"/>
             </a:lvl9pPr>
           </a:lstStyle>
           <a:p>
@@ -1541,8 +1541,8 @@
         </p:nvSpPr>
         <p:spPr>
           <a:xfrm>
-            <a:off x="6596539" y="2505075"/>
-            <a:ext cx="5539532" cy="3684588"/>
+            <a:off x="6172200" y="2421573"/>
+            <a:ext cx="5183188" cy="3561768"/>
           </a:xfrm>
         </p:spPr>
         <p:txBody>
@@ -1601,9 +1601,9 @@
           <a:bodyPr/>
           <a:lstStyle/>
           <a:p>
-            <a:fld id="{961B3E00-272A-CB49-9436-792A2B80BC36}" type="datetimeFigureOut">
+            <a:fld id="{58749126-4A29-7841-A2CD-BCBFE668F1B2}" type="datetimeFigureOut">
               <a:rPr lang="en-US" smtClean="0"/>
-              <a:t>9/16/20</a:t>
+              <a:t>9/30/20</a:t>
             </a:fld>
             <a:endParaRPr lang="en-US"/>
           </a:p>
@@ -1643,7 +1643,7 @@
           <a:bodyPr/>
           <a:lstStyle/>
           <a:p>
-            <a:fld id="{FF55A60A-9CF8-9E43-BD62-1B7BCFCE8BC3}" type="slidenum">
+            <a:fld id="{7B5027D2-4F26-8245-9719-1C4CDD60CB74}" type="slidenum">
               <a:rPr lang="en-US" smtClean="0"/>
               <a:t>‹#›</a:t>
             </a:fld>
@@ -1654,7 +1654,7 @@
     </p:spTree>
     <p:extLst>
       <p:ext uri="{BB962C8B-B14F-4D97-AF65-F5344CB8AC3E}">
-        <p14:creationId xmlns:p14="http://schemas.microsoft.com/office/powerpoint/2010/main" val="2499789267"/>
+        <p14:creationId xmlns:p14="http://schemas.microsoft.com/office/powerpoint/2010/main" val="1384143006"/>
       </p:ext>
     </p:extLst>
   </p:cSld>
@@ -1719,9 +1719,9 @@
           <a:bodyPr/>
           <a:lstStyle/>
           <a:p>
-            <a:fld id="{961B3E00-272A-CB49-9436-792A2B80BC36}" type="datetimeFigureOut">
+            <a:fld id="{58749126-4A29-7841-A2CD-BCBFE668F1B2}" type="datetimeFigureOut">
               <a:rPr lang="en-US" smtClean="0"/>
-              <a:t>9/16/20</a:t>
+              <a:t>9/30/20</a:t>
             </a:fld>
             <a:endParaRPr lang="en-US"/>
           </a:p>
@@ -1761,7 +1761,7 @@
           <a:bodyPr/>
           <a:lstStyle/>
           <a:p>
-            <a:fld id="{FF55A60A-9CF8-9E43-BD62-1B7BCFCE8BC3}" type="slidenum">
+            <a:fld id="{7B5027D2-4F26-8245-9719-1C4CDD60CB74}" type="slidenum">
               <a:rPr lang="en-US" smtClean="0"/>
               <a:t>‹#›</a:t>
             </a:fld>
@@ -1772,7 +1772,7 @@
     </p:spTree>
     <p:extLst>
       <p:ext uri="{BB962C8B-B14F-4D97-AF65-F5344CB8AC3E}">
-        <p14:creationId xmlns:p14="http://schemas.microsoft.com/office/powerpoint/2010/main" val="764751124"/>
+        <p14:creationId xmlns:p14="http://schemas.microsoft.com/office/powerpoint/2010/main" val="1607604892"/>
       </p:ext>
     </p:extLst>
   </p:cSld>
@@ -1814,9 +1814,9 @@
           <a:bodyPr/>
           <a:lstStyle/>
           <a:p>
-            <a:fld id="{961B3E00-272A-CB49-9436-792A2B80BC36}" type="datetimeFigureOut">
+            <a:fld id="{58749126-4A29-7841-A2CD-BCBFE668F1B2}" type="datetimeFigureOut">
               <a:rPr lang="en-US" smtClean="0"/>
-              <a:t>9/16/20</a:t>
+              <a:t>9/30/20</a:t>
             </a:fld>
             <a:endParaRPr lang="en-US"/>
           </a:p>
@@ -1856,7 +1856,7 @@
           <a:bodyPr/>
           <a:lstStyle/>
           <a:p>
-            <a:fld id="{FF55A60A-9CF8-9E43-BD62-1B7BCFCE8BC3}" type="slidenum">
+            <a:fld id="{7B5027D2-4F26-8245-9719-1C4CDD60CB74}" type="slidenum">
               <a:rPr lang="en-US" smtClean="0"/>
               <a:t>‹#›</a:t>
             </a:fld>
@@ -1867,7 +1867,7 @@
     </p:spTree>
     <p:extLst>
       <p:ext uri="{BB962C8B-B14F-4D97-AF65-F5344CB8AC3E}">
-        <p14:creationId xmlns:p14="http://schemas.microsoft.com/office/powerpoint/2010/main" val="2810112642"/>
+        <p14:creationId xmlns:p14="http://schemas.microsoft.com/office/powerpoint/2010/main" val="4222784569"/>
       </p:ext>
     </p:extLst>
   </p:cSld>
@@ -1906,15 +1906,15 @@
         </p:nvSpPr>
         <p:spPr>
           <a:xfrm>
-            <a:off x="897524" y="457200"/>
-            <a:ext cx="4202578" cy="1600200"/>
+            <a:off x="839789" y="441960"/>
+            <a:ext cx="3932237" cy="1546860"/>
           </a:xfrm>
         </p:spPr>
         <p:txBody>
           <a:bodyPr anchor="b"/>
           <a:lstStyle>
             <a:lvl1pPr>
-              <a:defRPr sz="3200"/>
+              <a:defRPr sz="3093"/>
             </a:lvl1pPr>
           </a:lstStyle>
           <a:p>
@@ -1938,39 +1938,39 @@
         </p:nvSpPr>
         <p:spPr>
           <a:xfrm>
-            <a:off x="5539532" y="987426"/>
-            <a:ext cx="6596539" cy="4873625"/>
+            <a:off x="5183188" y="954511"/>
+            <a:ext cx="6172200" cy="4711171"/>
           </a:xfrm>
         </p:spPr>
         <p:txBody>
           <a:bodyPr/>
           <a:lstStyle>
             <a:lvl1pPr>
-              <a:defRPr sz="3200"/>
+              <a:defRPr sz="3093"/>
             </a:lvl1pPr>
             <a:lvl2pPr>
-              <a:defRPr sz="2800"/>
+              <a:defRPr sz="2707"/>
             </a:lvl2pPr>
             <a:lvl3pPr>
-              <a:defRPr sz="2400"/>
+              <a:defRPr sz="2320"/>
             </a:lvl3pPr>
             <a:lvl4pPr>
-              <a:defRPr sz="2000"/>
+              <a:defRPr sz="1933"/>
             </a:lvl4pPr>
             <a:lvl5pPr>
-              <a:defRPr sz="2000"/>
+              <a:defRPr sz="1933"/>
             </a:lvl5pPr>
             <a:lvl6pPr>
-              <a:defRPr sz="2000"/>
+              <a:defRPr sz="1933"/>
             </a:lvl6pPr>
             <a:lvl7pPr>
-              <a:defRPr sz="2000"/>
+              <a:defRPr sz="1933"/>
             </a:lvl7pPr>
             <a:lvl8pPr>
-              <a:defRPr sz="2000"/>
+              <a:defRPr sz="1933"/>
             </a:lvl8pPr>
             <a:lvl9pPr>
-              <a:defRPr sz="2000"/>
+              <a:defRPr sz="1933"/>
             </a:lvl9pPr>
           </a:lstStyle>
           <a:p>
@@ -2023,8 +2023,8 @@
         </p:nvSpPr>
         <p:spPr>
           <a:xfrm>
-            <a:off x="897524" y="2057400"/>
-            <a:ext cx="4202578" cy="3811588"/>
+            <a:off x="839789" y="1988820"/>
+            <a:ext cx="3932237" cy="3684535"/>
           </a:xfrm>
         </p:spPr>
         <p:txBody>
@@ -2032,39 +2032,39 @@
           <a:lstStyle>
             <a:lvl1pPr marL="0" indent="0">
               <a:buNone/>
-              <a:defRPr sz="1600"/>
+              <a:defRPr sz="1547"/>
             </a:lvl1pPr>
-            <a:lvl2pPr marL="457200" indent="0">
-              <a:buNone/>
-              <a:defRPr sz="1400"/>
+            <a:lvl2pPr marL="441975" indent="0">
+              <a:buNone/>
+              <a:defRPr sz="1353"/>
             </a:lvl2pPr>
-            <a:lvl3pPr marL="914400" indent="0">
-              <a:buNone/>
-              <a:defRPr sz="1200"/>
+            <a:lvl3pPr marL="883950" indent="0">
+              <a:buNone/>
+              <a:defRPr sz="1160"/>
             </a:lvl3pPr>
-            <a:lvl4pPr marL="1371600" indent="0">
-              <a:buNone/>
-              <a:defRPr sz="1000"/>
+            <a:lvl4pPr marL="1325926" indent="0">
+              <a:buNone/>
+              <a:defRPr sz="967"/>
             </a:lvl4pPr>
-            <a:lvl5pPr marL="1828800" indent="0">
-              <a:buNone/>
-              <a:defRPr sz="1000"/>
+            <a:lvl5pPr marL="1767901" indent="0">
+              <a:buNone/>
+              <a:defRPr sz="967"/>
             </a:lvl5pPr>
-            <a:lvl6pPr marL="2286000" indent="0">
-              <a:buNone/>
-              <a:defRPr sz="1000"/>
+            <a:lvl6pPr marL="2209876" indent="0">
+              <a:buNone/>
+              <a:defRPr sz="967"/>
             </a:lvl6pPr>
-            <a:lvl7pPr marL="2743200" indent="0">
-              <a:buNone/>
-              <a:defRPr sz="1000"/>
+            <a:lvl7pPr marL="2651851" indent="0">
+              <a:buNone/>
+              <a:defRPr sz="967"/>
             </a:lvl7pPr>
-            <a:lvl8pPr marL="3200400" indent="0">
-              <a:buNone/>
-              <a:defRPr sz="1000"/>
+            <a:lvl8pPr marL="3093827" indent="0">
+              <a:buNone/>
+              <a:defRPr sz="967"/>
             </a:lvl8pPr>
-            <a:lvl9pPr marL="3657600" indent="0">
-              <a:buNone/>
-              <a:defRPr sz="1000"/>
+            <a:lvl9pPr marL="3535802" indent="0">
+              <a:buNone/>
+              <a:defRPr sz="967"/>
             </a:lvl9pPr>
           </a:lstStyle>
           <a:p>
@@ -2091,9 +2091,9 @@
           <a:bodyPr/>
           <a:lstStyle/>
           <a:p>
-            <a:fld id="{961B3E00-272A-CB49-9436-792A2B80BC36}" type="datetimeFigureOut">
+            <a:fld id="{58749126-4A29-7841-A2CD-BCBFE668F1B2}" type="datetimeFigureOut">
               <a:rPr lang="en-US" smtClean="0"/>
-              <a:t>9/16/20</a:t>
+              <a:t>9/30/20</a:t>
             </a:fld>
             <a:endParaRPr lang="en-US"/>
           </a:p>
@@ -2133,7 +2133,7 @@
           <a:bodyPr/>
           <a:lstStyle/>
           <a:p>
-            <a:fld id="{FF55A60A-9CF8-9E43-BD62-1B7BCFCE8BC3}" type="slidenum">
+            <a:fld id="{7B5027D2-4F26-8245-9719-1C4CDD60CB74}" type="slidenum">
               <a:rPr lang="en-US" smtClean="0"/>
               <a:t>‹#›</a:t>
             </a:fld>
@@ -2144,7 +2144,7 @@
     </p:spTree>
     <p:extLst>
       <p:ext uri="{BB962C8B-B14F-4D97-AF65-F5344CB8AC3E}">
-        <p14:creationId xmlns:p14="http://schemas.microsoft.com/office/powerpoint/2010/main" val="3126864055"/>
+        <p14:creationId xmlns:p14="http://schemas.microsoft.com/office/powerpoint/2010/main" val="122878214"/>
       </p:ext>
     </p:extLst>
   </p:cSld>
@@ -2183,15 +2183,15 @@
         </p:nvSpPr>
         <p:spPr>
           <a:xfrm>
-            <a:off x="897524" y="457200"/>
-            <a:ext cx="4202578" cy="1600200"/>
+            <a:off x="839789" y="441960"/>
+            <a:ext cx="3932237" cy="1546860"/>
           </a:xfrm>
         </p:spPr>
         <p:txBody>
           <a:bodyPr anchor="b"/>
           <a:lstStyle>
             <a:lvl1pPr>
-              <a:defRPr sz="3200"/>
+              <a:defRPr sz="3093"/>
             </a:lvl1pPr>
           </a:lstStyle>
           <a:p>
@@ -2215,8 +2215,8 @@
         </p:nvSpPr>
         <p:spPr>
           <a:xfrm>
-            <a:off x="5539532" y="987426"/>
-            <a:ext cx="6596539" cy="4873625"/>
+            <a:off x="5183188" y="954511"/>
+            <a:ext cx="6172200" cy="4711171"/>
           </a:xfrm>
         </p:spPr>
         <p:txBody>
@@ -2224,39 +2224,39 @@
           <a:lstStyle>
             <a:lvl1pPr marL="0" indent="0">
               <a:buNone/>
-              <a:defRPr sz="3200"/>
+              <a:defRPr sz="3093"/>
             </a:lvl1pPr>
-            <a:lvl2pPr marL="457200" indent="0">
-              <a:buNone/>
-              <a:defRPr sz="2800"/>
+            <a:lvl2pPr marL="441975" indent="0">
+              <a:buNone/>
+              <a:defRPr sz="2707"/>
             </a:lvl2pPr>
-            <a:lvl3pPr marL="914400" indent="0">
-              <a:buNone/>
-              <a:defRPr sz="2400"/>
+            <a:lvl3pPr marL="883950" indent="0">
+              <a:buNone/>
+              <a:defRPr sz="2320"/>
             </a:lvl3pPr>
-            <a:lvl4pPr marL="1371600" indent="0">
-              <a:buNone/>
-              <a:defRPr sz="2000"/>
+            <a:lvl4pPr marL="1325926" indent="0">
+              <a:buNone/>
+              <a:defRPr sz="1933"/>
             </a:lvl4pPr>
-            <a:lvl5pPr marL="1828800" indent="0">
-              <a:buNone/>
-              <a:defRPr sz="2000"/>
+            <a:lvl5pPr marL="1767901" indent="0">
+              <a:buNone/>
+              <a:defRPr sz="1933"/>
             </a:lvl5pPr>
-            <a:lvl6pPr marL="2286000" indent="0">
-              <a:buNone/>
-              <a:defRPr sz="2000"/>
+            <a:lvl6pPr marL="2209876" indent="0">
+              <a:buNone/>
+              <a:defRPr sz="1933"/>
             </a:lvl6pPr>
-            <a:lvl7pPr marL="2743200" indent="0">
-              <a:buNone/>
-              <a:defRPr sz="2000"/>
+            <a:lvl7pPr marL="2651851" indent="0">
+              <a:buNone/>
+              <a:defRPr sz="1933"/>
             </a:lvl7pPr>
-            <a:lvl8pPr marL="3200400" indent="0">
-              <a:buNone/>
-              <a:defRPr sz="2000"/>
+            <a:lvl8pPr marL="3093827" indent="0">
+              <a:buNone/>
+              <a:defRPr sz="1933"/>
             </a:lvl8pPr>
-            <a:lvl9pPr marL="3657600" indent="0">
-              <a:buNone/>
-              <a:defRPr sz="2000"/>
+            <a:lvl9pPr marL="3535802" indent="0">
+              <a:buNone/>
+              <a:defRPr sz="1933"/>
             </a:lvl9pPr>
           </a:lstStyle>
           <a:p>
@@ -2280,8 +2280,8 @@
         </p:nvSpPr>
         <p:spPr>
           <a:xfrm>
-            <a:off x="897524" y="2057400"/>
-            <a:ext cx="4202578" cy="3811588"/>
+            <a:off x="839789" y="1988820"/>
+            <a:ext cx="3932237" cy="3684535"/>
           </a:xfrm>
         </p:spPr>
         <p:txBody>
@@ -2289,39 +2289,39 @@
           <a:lstStyle>
             <a:lvl1pPr marL="0" indent="0">
               <a:buNone/>
-              <a:defRPr sz="1600"/>
+              <a:defRPr sz="1547"/>
             </a:lvl1pPr>
-            <a:lvl2pPr marL="457200" indent="0">
-              <a:buNone/>
-              <a:defRPr sz="1400"/>
+            <a:lvl2pPr marL="441975" indent="0">
+              <a:buNone/>
+              <a:defRPr sz="1353"/>
             </a:lvl2pPr>
-            <a:lvl3pPr marL="914400" indent="0">
-              <a:buNone/>
-              <a:defRPr sz="1200"/>
+            <a:lvl3pPr marL="883950" indent="0">
+              <a:buNone/>
+              <a:defRPr sz="1160"/>
             </a:lvl3pPr>
-            <a:lvl4pPr marL="1371600" indent="0">
-              <a:buNone/>
-              <a:defRPr sz="1000"/>
+            <a:lvl4pPr marL="1325926" indent="0">
+              <a:buNone/>
+              <a:defRPr sz="967"/>
             </a:lvl4pPr>
-            <a:lvl5pPr marL="1828800" indent="0">
-              <a:buNone/>
-              <a:defRPr sz="1000"/>
+            <a:lvl5pPr marL="1767901" indent="0">
+              <a:buNone/>
+              <a:defRPr sz="967"/>
             </a:lvl5pPr>
-            <a:lvl6pPr marL="2286000" indent="0">
-              <a:buNone/>
-              <a:defRPr sz="1000"/>
+            <a:lvl6pPr marL="2209876" indent="0">
+              <a:buNone/>
+              <a:defRPr sz="967"/>
             </a:lvl6pPr>
-            <a:lvl7pPr marL="2743200" indent="0">
-              <a:buNone/>
-              <a:defRPr sz="1000"/>
+            <a:lvl7pPr marL="2651851" indent="0">
+              <a:buNone/>
+              <a:defRPr sz="967"/>
             </a:lvl7pPr>
-            <a:lvl8pPr marL="3200400" indent="0">
-              <a:buNone/>
-              <a:defRPr sz="1000"/>
+            <a:lvl8pPr marL="3093827" indent="0">
+              <a:buNone/>
+              <a:defRPr sz="967"/>
             </a:lvl8pPr>
-            <a:lvl9pPr marL="3657600" indent="0">
-              <a:buNone/>
-              <a:defRPr sz="1000"/>
+            <a:lvl9pPr marL="3535802" indent="0">
+              <a:buNone/>
+              <a:defRPr sz="967"/>
             </a:lvl9pPr>
           </a:lstStyle>
           <a:p>
@@ -2348,9 +2348,9 @@
           <a:bodyPr/>
           <a:lstStyle/>
           <a:p>
-            <a:fld id="{961B3E00-272A-CB49-9436-792A2B80BC36}" type="datetimeFigureOut">
+            <a:fld id="{58749126-4A29-7841-A2CD-BCBFE668F1B2}" type="datetimeFigureOut">
               <a:rPr lang="en-US" smtClean="0"/>
-              <a:t>9/16/20</a:t>
+              <a:t>9/30/20</a:t>
             </a:fld>
             <a:endParaRPr lang="en-US"/>
           </a:p>
@@ -2390,7 +2390,7 @@
           <a:bodyPr/>
           <a:lstStyle/>
           <a:p>
-            <a:fld id="{FF55A60A-9CF8-9E43-BD62-1B7BCFCE8BC3}" type="slidenum">
+            <a:fld id="{7B5027D2-4F26-8245-9719-1C4CDD60CB74}" type="slidenum">
               <a:rPr lang="en-US" smtClean="0"/>
               <a:t>‹#›</a:t>
             </a:fld>
@@ -2401,7 +2401,7 @@
     </p:spTree>
     <p:extLst>
       <p:ext uri="{BB962C8B-B14F-4D97-AF65-F5344CB8AC3E}">
-        <p14:creationId xmlns:p14="http://schemas.microsoft.com/office/powerpoint/2010/main" val="2273667774"/>
+        <p14:creationId xmlns:p14="http://schemas.microsoft.com/office/powerpoint/2010/main" val="1588334397"/>
       </p:ext>
     </p:extLst>
   </p:cSld>
@@ -2445,8 +2445,8 @@
         </p:nvSpPr>
         <p:spPr>
           <a:xfrm>
-            <a:off x="895826" y="365126"/>
-            <a:ext cx="11238548" cy="1325563"/>
+            <a:off x="838200" y="352954"/>
+            <a:ext cx="10515600" cy="1281378"/>
           </a:xfrm>
           <a:prstGeom prst="rect">
             <a:avLst/>
@@ -2478,8 +2478,8 @@
         </p:nvSpPr>
         <p:spPr>
           <a:xfrm>
-            <a:off x="895826" y="1825625"/>
-            <a:ext cx="11238548" cy="4351338"/>
+            <a:off x="838200" y="1764771"/>
+            <a:ext cx="10515600" cy="4206293"/>
           </a:xfrm>
           <a:prstGeom prst="rect">
             <a:avLst/>
@@ -2540,8 +2540,8 @@
         </p:nvSpPr>
         <p:spPr>
           <a:xfrm>
-            <a:off x="895826" y="6356351"/>
-            <a:ext cx="2931795" cy="365125"/>
+            <a:off x="838200" y="6144472"/>
+            <a:ext cx="2743200" cy="352954"/>
           </a:xfrm>
           <a:prstGeom prst="rect">
             <a:avLst/>
@@ -2551,7 +2551,7 @@
           <a:bodyPr vert="horz" lIns="91440" tIns="45720" rIns="91440" bIns="45720" rtlCol="0" anchor="ctr"/>
           <a:lstStyle>
             <a:lvl1pPr algn="l">
-              <a:defRPr sz="1200">
+              <a:defRPr sz="1160">
                 <a:solidFill>
                   <a:schemeClr val="tx1">
                     <a:tint val="75000"/>
@@ -2561,9 +2561,9 @@
             </a:lvl1pPr>
           </a:lstStyle>
           <a:p>
-            <a:fld id="{961B3E00-272A-CB49-9436-792A2B80BC36}" type="datetimeFigureOut">
+            <a:fld id="{58749126-4A29-7841-A2CD-BCBFE668F1B2}" type="datetimeFigureOut">
               <a:rPr lang="en-US" smtClean="0"/>
-              <a:t>9/16/20</a:t>
+              <a:t>9/30/20</a:t>
             </a:fld>
             <a:endParaRPr lang="en-US"/>
           </a:p>
@@ -2581,8 +2581,8 @@
         </p:nvSpPr>
         <p:spPr>
           <a:xfrm>
-            <a:off x="4316254" y="6356351"/>
-            <a:ext cx="4397693" cy="365125"/>
+            <a:off x="4038600" y="6144472"/>
+            <a:ext cx="4114800" cy="352954"/>
           </a:xfrm>
           <a:prstGeom prst="rect">
             <a:avLst/>
@@ -2592,7 +2592,7 @@
           <a:bodyPr vert="horz" lIns="91440" tIns="45720" rIns="91440" bIns="45720" rtlCol="0" anchor="ctr"/>
           <a:lstStyle>
             <a:lvl1pPr algn="ctr">
-              <a:defRPr sz="1200">
+              <a:defRPr sz="1160">
                 <a:solidFill>
                   <a:schemeClr val="tx1">
                     <a:tint val="75000"/>
@@ -2618,8 +2618,8 @@
         </p:nvSpPr>
         <p:spPr>
           <a:xfrm>
-            <a:off x="9202579" y="6356351"/>
-            <a:ext cx="2931795" cy="365125"/>
+            <a:off x="8610600" y="6144472"/>
+            <a:ext cx="2743200" cy="352954"/>
           </a:xfrm>
           <a:prstGeom prst="rect">
             <a:avLst/>
@@ -2629,7 +2629,7 @@
           <a:bodyPr vert="horz" lIns="91440" tIns="45720" rIns="91440" bIns="45720" rtlCol="0" anchor="ctr"/>
           <a:lstStyle>
             <a:lvl1pPr algn="r">
-              <a:defRPr sz="1200">
+              <a:defRPr sz="1160">
                 <a:solidFill>
                   <a:schemeClr val="tx1">
                     <a:tint val="75000"/>
@@ -2639,7 +2639,7 @@
             </a:lvl1pPr>
           </a:lstStyle>
           <a:p>
-            <a:fld id="{FF55A60A-9CF8-9E43-BD62-1B7BCFCE8BC3}" type="slidenum">
+            <a:fld id="{7B5027D2-4F26-8245-9719-1C4CDD60CB74}" type="slidenum">
               <a:rPr lang="en-US" smtClean="0"/>
               <a:t>‹#›</a:t>
             </a:fld>
@@ -2650,27 +2650,27 @@
     </p:spTree>
     <p:extLst>
       <p:ext uri="{BB962C8B-B14F-4D97-AF65-F5344CB8AC3E}">
-        <p14:creationId xmlns:p14="http://schemas.microsoft.com/office/powerpoint/2010/main" val="1820048126"/>
+        <p14:creationId xmlns:p14="http://schemas.microsoft.com/office/powerpoint/2010/main" val="3190230614"/>
       </p:ext>
     </p:extLst>
   </p:cSld>
   <p:clrMap bg1="lt1" tx1="dk1" bg2="lt2" tx2="dk2" accent1="accent1" accent2="accent2" accent3="accent3" accent4="accent4" accent5="accent5" accent6="accent6" hlink="hlink" folHlink="folHlink"/>
   <p:sldLayoutIdLst>
-    <p:sldLayoutId id="2147483673" r:id="rId1"/>
-    <p:sldLayoutId id="2147483674" r:id="rId2"/>
-    <p:sldLayoutId id="2147483675" r:id="rId3"/>
-    <p:sldLayoutId id="2147483676" r:id="rId4"/>
-    <p:sldLayoutId id="2147483677" r:id="rId5"/>
-    <p:sldLayoutId id="2147483678" r:id="rId6"/>
-    <p:sldLayoutId id="2147483679" r:id="rId7"/>
-    <p:sldLayoutId id="2147483680" r:id="rId8"/>
-    <p:sldLayoutId id="2147483681" r:id="rId9"/>
-    <p:sldLayoutId id="2147483682" r:id="rId10"/>
-    <p:sldLayoutId id="2147483683" r:id="rId11"/>
+    <p:sldLayoutId id="2147483661" r:id="rId1"/>
+    <p:sldLayoutId id="2147483662" r:id="rId2"/>
+    <p:sldLayoutId id="2147483663" r:id="rId3"/>
+    <p:sldLayoutId id="2147483664" r:id="rId4"/>
+    <p:sldLayoutId id="2147483665" r:id="rId5"/>
+    <p:sldLayoutId id="2147483666" r:id="rId6"/>
+    <p:sldLayoutId id="2147483667" r:id="rId7"/>
+    <p:sldLayoutId id="2147483668" r:id="rId8"/>
+    <p:sldLayoutId id="2147483669" r:id="rId9"/>
+    <p:sldLayoutId id="2147483670" r:id="rId10"/>
+    <p:sldLayoutId id="2147483671" r:id="rId11"/>
   </p:sldLayoutIdLst>
   <p:txStyles>
     <p:titleStyle>
-      <a:lvl1pPr algn="l" defTabSz="914400" rtl="0" eaLnBrk="1" latinLnBrk="0" hangingPunct="1">
+      <a:lvl1pPr algn="l" defTabSz="883950" rtl="0" eaLnBrk="1" latinLnBrk="0" hangingPunct="1">
         <a:lnSpc>
           <a:spcPct val="90000"/>
         </a:lnSpc>
@@ -2678,7 +2678,7 @@
           <a:spcPct val="0"/>
         </a:spcBef>
         <a:buNone/>
-        <a:defRPr sz="4400" kern="1200">
+        <a:defRPr sz="4253" kern="1200">
           <a:solidFill>
             <a:schemeClr val="tx1"/>
           </a:solidFill>
@@ -2689,16 +2689,16 @@
       </a:lvl1pPr>
     </p:titleStyle>
     <p:bodyStyle>
-      <a:lvl1pPr marL="228600" indent="-228600" algn="l" defTabSz="914400" rtl="0" eaLnBrk="1" latinLnBrk="0" hangingPunct="1">
+      <a:lvl1pPr marL="220988" indent="-220988" algn="l" defTabSz="883950" rtl="0" eaLnBrk="1" latinLnBrk="0" hangingPunct="1">
         <a:lnSpc>
           <a:spcPct val="90000"/>
         </a:lnSpc>
         <a:spcBef>
-          <a:spcPts val="1000"/>
+          <a:spcPts val="967"/>
         </a:spcBef>
         <a:buFont typeface="Arial" panose="020B0604020202020204" pitchFamily="34" charset="0"/>
         <a:buChar char="•"/>
-        <a:defRPr sz="2800" kern="1200">
+        <a:defRPr sz="2707" kern="1200">
           <a:solidFill>
             <a:schemeClr val="tx1"/>
           </a:solidFill>
@@ -2707,16 +2707,16 @@
           <a:cs typeface="+mn-cs"/>
         </a:defRPr>
       </a:lvl1pPr>
-      <a:lvl2pPr marL="685800" indent="-228600" algn="l" defTabSz="914400" rtl="0" eaLnBrk="1" latinLnBrk="0" hangingPunct="1">
+      <a:lvl2pPr marL="662963" indent="-220988" algn="l" defTabSz="883950" rtl="0" eaLnBrk="1" latinLnBrk="0" hangingPunct="1">
         <a:lnSpc>
           <a:spcPct val="90000"/>
         </a:lnSpc>
         <a:spcBef>
-          <a:spcPts val="500"/>
+          <a:spcPts val="483"/>
         </a:spcBef>
         <a:buFont typeface="Arial" panose="020B0604020202020204" pitchFamily="34" charset="0"/>
         <a:buChar char="•"/>
-        <a:defRPr sz="2400" kern="1200">
+        <a:defRPr sz="2320" kern="1200">
           <a:solidFill>
             <a:schemeClr val="tx1"/>
           </a:solidFill>
@@ -2725,16 +2725,16 @@
           <a:cs typeface="+mn-cs"/>
         </a:defRPr>
       </a:lvl2pPr>
-      <a:lvl3pPr marL="1143000" indent="-228600" algn="l" defTabSz="914400" rtl="0" eaLnBrk="1" latinLnBrk="0" hangingPunct="1">
+      <a:lvl3pPr marL="1104938" indent="-220988" algn="l" defTabSz="883950" rtl="0" eaLnBrk="1" latinLnBrk="0" hangingPunct="1">
         <a:lnSpc>
           <a:spcPct val="90000"/>
         </a:lnSpc>
         <a:spcBef>
-          <a:spcPts val="500"/>
+          <a:spcPts val="483"/>
         </a:spcBef>
         <a:buFont typeface="Arial" panose="020B0604020202020204" pitchFamily="34" charset="0"/>
         <a:buChar char="•"/>
-        <a:defRPr sz="2000" kern="1200">
+        <a:defRPr sz="1933" kern="1200">
           <a:solidFill>
             <a:schemeClr val="tx1"/>
           </a:solidFill>
@@ -2743,16 +2743,16 @@
           <a:cs typeface="+mn-cs"/>
         </a:defRPr>
       </a:lvl3pPr>
-      <a:lvl4pPr marL="1600200" indent="-228600" algn="l" defTabSz="914400" rtl="0" eaLnBrk="1" latinLnBrk="0" hangingPunct="1">
+      <a:lvl4pPr marL="1546913" indent="-220988" algn="l" defTabSz="883950" rtl="0" eaLnBrk="1" latinLnBrk="0" hangingPunct="1">
         <a:lnSpc>
           <a:spcPct val="90000"/>
         </a:lnSpc>
         <a:spcBef>
-          <a:spcPts val="500"/>
+          <a:spcPts val="483"/>
         </a:spcBef>
         <a:buFont typeface="Arial" panose="020B0604020202020204" pitchFamily="34" charset="0"/>
         <a:buChar char="•"/>
-        <a:defRPr sz="1800" kern="1200">
+        <a:defRPr sz="1740" kern="1200">
           <a:solidFill>
             <a:schemeClr val="tx1"/>
           </a:solidFill>
@@ -2761,16 +2761,16 @@
           <a:cs typeface="+mn-cs"/>
         </a:defRPr>
       </a:lvl4pPr>
-      <a:lvl5pPr marL="2057400" indent="-228600" algn="l" defTabSz="914400" rtl="0" eaLnBrk="1" latinLnBrk="0" hangingPunct="1">
+      <a:lvl5pPr marL="1988889" indent="-220988" algn="l" defTabSz="883950" rtl="0" eaLnBrk="1" latinLnBrk="0" hangingPunct="1">
         <a:lnSpc>
           <a:spcPct val="90000"/>
         </a:lnSpc>
         <a:spcBef>
-          <a:spcPts val="500"/>
+          <a:spcPts val="483"/>
         </a:spcBef>
         <a:buFont typeface="Arial" panose="020B0604020202020204" pitchFamily="34" charset="0"/>
         <a:buChar char="•"/>
-        <a:defRPr sz="1800" kern="1200">
+        <a:defRPr sz="1740" kern="1200">
           <a:solidFill>
             <a:schemeClr val="tx1"/>
           </a:solidFill>
@@ -2779,16 +2779,16 @@
           <a:cs typeface="+mn-cs"/>
         </a:defRPr>
       </a:lvl5pPr>
-      <a:lvl6pPr marL="2514600" indent="-228600" algn="l" defTabSz="914400" rtl="0" eaLnBrk="1" latinLnBrk="0" hangingPunct="1">
+      <a:lvl6pPr marL="2430864" indent="-220988" algn="l" defTabSz="883950" rtl="0" eaLnBrk="1" latinLnBrk="0" hangingPunct="1">
         <a:lnSpc>
           <a:spcPct val="90000"/>
         </a:lnSpc>
         <a:spcBef>
-          <a:spcPts val="500"/>
+          <a:spcPts val="483"/>
         </a:spcBef>
         <a:buFont typeface="Arial" panose="020B0604020202020204" pitchFamily="34" charset="0"/>
         <a:buChar char="•"/>
-        <a:defRPr sz="1800" kern="1200">
+        <a:defRPr sz="1740" kern="1200">
           <a:solidFill>
             <a:schemeClr val="tx1"/>
           </a:solidFill>
@@ -2797,16 +2797,16 @@
           <a:cs typeface="+mn-cs"/>
         </a:defRPr>
       </a:lvl6pPr>
-      <a:lvl7pPr marL="2971800" indent="-228600" algn="l" defTabSz="914400" rtl="0" eaLnBrk="1" latinLnBrk="0" hangingPunct="1">
+      <a:lvl7pPr marL="2872839" indent="-220988" algn="l" defTabSz="883950" rtl="0" eaLnBrk="1" latinLnBrk="0" hangingPunct="1">
         <a:lnSpc>
           <a:spcPct val="90000"/>
         </a:lnSpc>
         <a:spcBef>
-          <a:spcPts val="500"/>
+          <a:spcPts val="483"/>
         </a:spcBef>
         <a:buFont typeface="Arial" panose="020B0604020202020204" pitchFamily="34" charset="0"/>
         <a:buChar char="•"/>
-        <a:defRPr sz="1800" kern="1200">
+        <a:defRPr sz="1740" kern="1200">
           <a:solidFill>
             <a:schemeClr val="tx1"/>
           </a:solidFill>
@@ -2815,16 +2815,16 @@
           <a:cs typeface="+mn-cs"/>
         </a:defRPr>
       </a:lvl7pPr>
-      <a:lvl8pPr marL="3429000" indent="-228600" algn="l" defTabSz="914400" rtl="0" eaLnBrk="1" latinLnBrk="0" hangingPunct="1">
+      <a:lvl8pPr marL="3314814" indent="-220988" algn="l" defTabSz="883950" rtl="0" eaLnBrk="1" latinLnBrk="0" hangingPunct="1">
         <a:lnSpc>
           <a:spcPct val="90000"/>
         </a:lnSpc>
         <a:spcBef>
-          <a:spcPts val="500"/>
+          <a:spcPts val="483"/>
         </a:spcBef>
         <a:buFont typeface="Arial" panose="020B0604020202020204" pitchFamily="34" charset="0"/>
         <a:buChar char="•"/>
-        <a:defRPr sz="1800" kern="1200">
+        <a:defRPr sz="1740" kern="1200">
           <a:solidFill>
             <a:schemeClr val="tx1"/>
           </a:solidFill>
@@ -2833,16 +2833,16 @@
           <a:cs typeface="+mn-cs"/>
         </a:defRPr>
       </a:lvl8pPr>
-      <a:lvl9pPr marL="3886200" indent="-228600" algn="l" defTabSz="914400" rtl="0" eaLnBrk="1" latinLnBrk="0" hangingPunct="1">
+      <a:lvl9pPr marL="3756790" indent="-220988" algn="l" defTabSz="883950" rtl="0" eaLnBrk="1" latinLnBrk="0" hangingPunct="1">
         <a:lnSpc>
           <a:spcPct val="90000"/>
         </a:lnSpc>
         <a:spcBef>
-          <a:spcPts val="500"/>
+          <a:spcPts val="483"/>
         </a:spcBef>
         <a:buFont typeface="Arial" panose="020B0604020202020204" pitchFamily="34" charset="0"/>
         <a:buChar char="•"/>
-        <a:defRPr sz="1800" kern="1200">
+        <a:defRPr sz="1740" kern="1200">
           <a:solidFill>
             <a:schemeClr val="tx1"/>
           </a:solidFill>
@@ -2856,8 +2856,8 @@
       <a:defPPr>
         <a:defRPr lang="en-US"/>
       </a:defPPr>
-      <a:lvl1pPr marL="0" algn="l" defTabSz="914400" rtl="0" eaLnBrk="1" latinLnBrk="0" hangingPunct="1">
-        <a:defRPr sz="1800" kern="1200">
+      <a:lvl1pPr marL="0" algn="l" defTabSz="883950" rtl="0" eaLnBrk="1" latinLnBrk="0" hangingPunct="1">
+        <a:defRPr sz="1740" kern="1200">
           <a:solidFill>
             <a:schemeClr val="tx1"/>
           </a:solidFill>
@@ -2866,8 +2866,8 @@
           <a:cs typeface="+mn-cs"/>
         </a:defRPr>
       </a:lvl1pPr>
-      <a:lvl2pPr marL="457200" algn="l" defTabSz="914400" rtl="0" eaLnBrk="1" latinLnBrk="0" hangingPunct="1">
-        <a:defRPr sz="1800" kern="1200">
+      <a:lvl2pPr marL="441975" algn="l" defTabSz="883950" rtl="0" eaLnBrk="1" latinLnBrk="0" hangingPunct="1">
+        <a:defRPr sz="1740" kern="1200">
           <a:solidFill>
             <a:schemeClr val="tx1"/>
           </a:solidFill>
@@ -2876,8 +2876,8 @@
           <a:cs typeface="+mn-cs"/>
         </a:defRPr>
       </a:lvl2pPr>
-      <a:lvl3pPr marL="914400" algn="l" defTabSz="914400" rtl="0" eaLnBrk="1" latinLnBrk="0" hangingPunct="1">
-        <a:defRPr sz="1800" kern="1200">
+      <a:lvl3pPr marL="883950" algn="l" defTabSz="883950" rtl="0" eaLnBrk="1" latinLnBrk="0" hangingPunct="1">
+        <a:defRPr sz="1740" kern="1200">
           <a:solidFill>
             <a:schemeClr val="tx1"/>
           </a:solidFill>
@@ -2886,8 +2886,8 @@
           <a:cs typeface="+mn-cs"/>
         </a:defRPr>
       </a:lvl3pPr>
-      <a:lvl4pPr marL="1371600" algn="l" defTabSz="914400" rtl="0" eaLnBrk="1" latinLnBrk="0" hangingPunct="1">
-        <a:defRPr sz="1800" kern="1200">
+      <a:lvl4pPr marL="1325926" algn="l" defTabSz="883950" rtl="0" eaLnBrk="1" latinLnBrk="0" hangingPunct="1">
+        <a:defRPr sz="1740" kern="1200">
           <a:solidFill>
             <a:schemeClr val="tx1"/>
           </a:solidFill>
@@ -2896,8 +2896,8 @@
           <a:cs typeface="+mn-cs"/>
         </a:defRPr>
       </a:lvl4pPr>
-      <a:lvl5pPr marL="1828800" algn="l" defTabSz="914400" rtl="0" eaLnBrk="1" latinLnBrk="0" hangingPunct="1">
-        <a:defRPr sz="1800" kern="1200">
+      <a:lvl5pPr marL="1767901" algn="l" defTabSz="883950" rtl="0" eaLnBrk="1" latinLnBrk="0" hangingPunct="1">
+        <a:defRPr sz="1740" kern="1200">
           <a:solidFill>
             <a:schemeClr val="tx1"/>
           </a:solidFill>
@@ -2906,8 +2906,8 @@
           <a:cs typeface="+mn-cs"/>
         </a:defRPr>
       </a:lvl5pPr>
-      <a:lvl6pPr marL="2286000" algn="l" defTabSz="914400" rtl="0" eaLnBrk="1" latinLnBrk="0" hangingPunct="1">
-        <a:defRPr sz="1800" kern="1200">
+      <a:lvl6pPr marL="2209876" algn="l" defTabSz="883950" rtl="0" eaLnBrk="1" latinLnBrk="0" hangingPunct="1">
+        <a:defRPr sz="1740" kern="1200">
           <a:solidFill>
             <a:schemeClr val="tx1"/>
           </a:solidFill>
@@ -2916,8 +2916,8 @@
           <a:cs typeface="+mn-cs"/>
         </a:defRPr>
       </a:lvl6pPr>
-      <a:lvl7pPr marL="2743200" algn="l" defTabSz="914400" rtl="0" eaLnBrk="1" latinLnBrk="0" hangingPunct="1">
-        <a:defRPr sz="1800" kern="1200">
+      <a:lvl7pPr marL="2651851" algn="l" defTabSz="883950" rtl="0" eaLnBrk="1" latinLnBrk="0" hangingPunct="1">
+        <a:defRPr sz="1740" kern="1200">
           <a:solidFill>
             <a:schemeClr val="tx1"/>
           </a:solidFill>
@@ -2926,8 +2926,8 @@
           <a:cs typeface="+mn-cs"/>
         </a:defRPr>
       </a:lvl7pPr>
-      <a:lvl8pPr marL="3200400" algn="l" defTabSz="914400" rtl="0" eaLnBrk="1" latinLnBrk="0" hangingPunct="1">
-        <a:defRPr sz="1800" kern="1200">
+      <a:lvl8pPr marL="3093827" algn="l" defTabSz="883950" rtl="0" eaLnBrk="1" latinLnBrk="0" hangingPunct="1">
+        <a:defRPr sz="1740" kern="1200">
           <a:solidFill>
             <a:schemeClr val="tx1"/>
           </a:solidFill>
@@ -2936,8 +2936,8 @@
           <a:cs typeface="+mn-cs"/>
         </a:defRPr>
       </a:lvl8pPr>
-      <a:lvl9pPr marL="3657600" algn="l" defTabSz="914400" rtl="0" eaLnBrk="1" latinLnBrk="0" hangingPunct="1">
-        <a:defRPr sz="1800" kern="1200">
+      <a:lvl9pPr marL="3535802" algn="l" defTabSz="883950" rtl="0" eaLnBrk="1" latinLnBrk="0" hangingPunct="1">
+        <a:defRPr sz="1740" kern="1200">
           <a:solidFill>
             <a:schemeClr val="tx1"/>
           </a:solidFill>
@@ -2970,10 +2970,10 @@
       </p:grpSpPr>
       <p:pic>
         <p:nvPicPr>
-          <p:cNvPr id="10" name="Picture 9">
+          <p:cNvPr id="6" name="Picture 5">
             <a:extLst>
               <a:ext uri="{FF2B5EF4-FFF2-40B4-BE49-F238E27FC236}">
-                <a16:creationId xmlns:a16="http://schemas.microsoft.com/office/drawing/2014/main" id="{45C20009-998C-FA4E-995B-DD26BBD1E549}"/>
+                <a16:creationId xmlns:a16="http://schemas.microsoft.com/office/drawing/2014/main" id="{D7EF5387-F249-454F-878E-F91582F9D1AF}"/>
               </a:ext>
             </a:extLst>
           </p:cNvPr>
@@ -2989,7 +2989,7 @@
         </p:blipFill>
         <p:spPr>
           <a:xfrm>
-            <a:off x="7718380" y="352425"/>
+            <a:off x="6993861" y="234168"/>
             <a:ext cx="5050994" cy="2757539"/>
           </a:xfrm>
           <a:prstGeom prst="rect">
@@ -2999,10 +2999,10 @@
       </p:pic>
       <p:pic>
         <p:nvPicPr>
-          <p:cNvPr id="12" name="Picture 11">
+          <p:cNvPr id="7" name="Picture 6">
             <a:extLst>
               <a:ext uri="{FF2B5EF4-FFF2-40B4-BE49-F238E27FC236}">
-                <a16:creationId xmlns:a16="http://schemas.microsoft.com/office/drawing/2014/main" id="{2D6BE252-7A44-7B4E-8F89-E5F4AD397D2C}"/>
+                <a16:creationId xmlns:a16="http://schemas.microsoft.com/office/drawing/2014/main" id="{E4485EF7-98B7-2649-BFDD-D3ACBB17BBA7}"/>
               </a:ext>
             </a:extLst>
           </p:cNvPr>
@@ -3018,7 +3018,7 @@
         </p:blipFill>
         <p:spPr>
           <a:xfrm>
-            <a:off x="7718380" y="3816350"/>
+            <a:off x="6993861" y="3575260"/>
             <a:ext cx="5101838" cy="2769888"/>
           </a:xfrm>
           <a:prstGeom prst="rect">
@@ -3028,10 +3028,10 @@
       </p:pic>
       <p:sp>
         <p:nvSpPr>
-          <p:cNvPr id="15" name="Rectangle 14">
+          <p:cNvPr id="8" name="Rectangle 7">
             <a:extLst>
               <a:ext uri="{FF2B5EF4-FFF2-40B4-BE49-F238E27FC236}">
-                <a16:creationId xmlns:a16="http://schemas.microsoft.com/office/drawing/2014/main" id="{8BE5D064-FBAC-4C49-AB53-C0390A3D3CE6}"/>
+                <a16:creationId xmlns:a16="http://schemas.microsoft.com/office/drawing/2014/main" id="{58FFBE60-72A6-BD46-AA14-3E567F2C2026}"/>
               </a:ext>
             </a:extLst>
           </p:cNvPr>
@@ -3040,7 +3040,7 @@
         </p:nvSpPr>
         <p:spPr>
           <a:xfrm>
-            <a:off x="7776215" y="1926612"/>
+            <a:off x="7051696" y="1808355"/>
             <a:ext cx="981102" cy="307777"/>
           </a:xfrm>
           <a:prstGeom prst="rect">
@@ -3048,7 +3048,7 @@
           </a:prstGeom>
         </p:spPr>
         <p:txBody>
-          <a:bodyPr wrap="none">
+          <a:bodyPr wrap="square">
             <a:spAutoFit/>
           </a:bodyPr>
           <a:lstStyle/>
@@ -3068,10 +3068,10 @@
       </p:sp>
       <p:sp>
         <p:nvSpPr>
-          <p:cNvPr id="17" name="Rectangle 16">
+          <p:cNvPr id="9" name="Rectangle 8">
             <a:extLst>
               <a:ext uri="{FF2B5EF4-FFF2-40B4-BE49-F238E27FC236}">
-                <a16:creationId xmlns:a16="http://schemas.microsoft.com/office/drawing/2014/main" id="{9F367BDA-F05C-AD44-B1F9-9AC6E03971D0}"/>
+                <a16:creationId xmlns:a16="http://schemas.microsoft.com/office/drawing/2014/main" id="{292A57D7-B8F1-9146-AA79-1D20B37996B3}"/>
               </a:ext>
             </a:extLst>
           </p:cNvPr>
@@ -3080,7 +3080,7 @@
         </p:nvSpPr>
         <p:spPr>
           <a:xfrm>
-            <a:off x="7835333" y="2630331"/>
+            <a:off x="7110815" y="2512074"/>
             <a:ext cx="990977" cy="307777"/>
           </a:xfrm>
           <a:prstGeom prst="rect">
@@ -3088,7 +3088,7 @@
           </a:prstGeom>
         </p:spPr>
         <p:txBody>
-          <a:bodyPr wrap="none">
+          <a:bodyPr wrap="square">
             <a:spAutoFit/>
           </a:bodyPr>
           <a:lstStyle/>
@@ -3108,10 +3108,10 @@
       </p:sp>
       <p:sp>
         <p:nvSpPr>
-          <p:cNvPr id="18" name="Rectangle 17">
+          <p:cNvPr id="10" name="Rectangle 9">
             <a:extLst>
               <a:ext uri="{FF2B5EF4-FFF2-40B4-BE49-F238E27FC236}">
-                <a16:creationId xmlns:a16="http://schemas.microsoft.com/office/drawing/2014/main" id="{4A99BA1D-D3AE-4C43-B3FF-76959EC1CF71}"/>
+                <a16:creationId xmlns:a16="http://schemas.microsoft.com/office/drawing/2014/main" id="{1D7F6A59-3F7B-D047-83CF-9942B1B545C2}"/>
               </a:ext>
             </a:extLst>
           </p:cNvPr>
@@ -3120,7 +3120,7 @@
         </p:nvSpPr>
         <p:spPr>
           <a:xfrm>
-            <a:off x="7829426" y="5381589"/>
+            <a:off x="7104907" y="5140500"/>
             <a:ext cx="981102" cy="307777"/>
           </a:xfrm>
           <a:prstGeom prst="rect">
@@ -3128,7 +3128,7 @@
           </a:prstGeom>
         </p:spPr>
         <p:txBody>
-          <a:bodyPr wrap="none">
+          <a:bodyPr wrap="square">
             <a:spAutoFit/>
           </a:bodyPr>
           <a:lstStyle/>
@@ -3148,10 +3148,10 @@
       </p:sp>
       <p:sp>
         <p:nvSpPr>
-          <p:cNvPr id="19" name="Rectangle 18">
+          <p:cNvPr id="11" name="Rectangle 10">
             <a:extLst>
               <a:ext uri="{FF2B5EF4-FFF2-40B4-BE49-F238E27FC236}">
-                <a16:creationId xmlns:a16="http://schemas.microsoft.com/office/drawing/2014/main" id="{2A54FD8D-CB3E-8543-AAC3-9D4958CFF460}"/>
+                <a16:creationId xmlns:a16="http://schemas.microsoft.com/office/drawing/2014/main" id="{830E70EE-368D-F443-9176-E4CCC4F26915}"/>
               </a:ext>
             </a:extLst>
           </p:cNvPr>
@@ -3160,7 +3160,7 @@
         </p:nvSpPr>
         <p:spPr>
           <a:xfrm>
-            <a:off x="7888544" y="6085308"/>
+            <a:off x="7164026" y="5844219"/>
             <a:ext cx="990977" cy="307777"/>
           </a:xfrm>
           <a:prstGeom prst="rect">
@@ -3168,7 +3168,7 @@
           </a:prstGeom>
         </p:spPr>
         <p:txBody>
-          <a:bodyPr wrap="none">
+          <a:bodyPr wrap="square">
             <a:spAutoFit/>
           </a:bodyPr>
           <a:lstStyle/>
@@ -3188,10 +3188,10 @@
       </p:sp>
       <p:sp>
         <p:nvSpPr>
-          <p:cNvPr id="6" name="Rectangle 5">
+          <p:cNvPr id="12" name="Rectangle 11">
             <a:extLst>
               <a:ext uri="{FF2B5EF4-FFF2-40B4-BE49-F238E27FC236}">
-                <a16:creationId xmlns:a16="http://schemas.microsoft.com/office/drawing/2014/main" id="{3112903C-F3F9-A54D-A529-04A0FB2DBDDE}"/>
+                <a16:creationId xmlns:a16="http://schemas.microsoft.com/office/drawing/2014/main" id="{F617CFDF-2B24-3143-AB23-25F38E82EA5D}"/>
               </a:ext>
             </a:extLst>
           </p:cNvPr>
@@ -3200,81 +3200,7 @@
         </p:nvSpPr>
         <p:spPr>
           <a:xfrm>
-            <a:off x="138731" y="3"/>
-            <a:ext cx="389850" cy="461665"/>
-          </a:xfrm>
-          <a:prstGeom prst="rect">
-            <a:avLst/>
-          </a:prstGeom>
-        </p:spPr>
-        <p:txBody>
-          <a:bodyPr wrap="none">
-            <a:spAutoFit/>
-          </a:bodyPr>
-          <a:lstStyle/>
-          <a:p>
-            <a:r>
-              <a:rPr lang="en-US" sz="2400" dirty="0">
-                <a:latin typeface="Arial" panose="020B0604020202020204" pitchFamily="34" charset="0"/>
-                <a:cs typeface="Arial" panose="020B0604020202020204" pitchFamily="34" charset="0"/>
-              </a:rPr>
-              <a:t>A</a:t>
-            </a:r>
-          </a:p>
-        </p:txBody>
-      </p:sp>
-      <p:sp>
-        <p:nvSpPr>
-          <p:cNvPr id="13" name="Rectangle 12">
-            <a:extLst>
-              <a:ext uri="{FF2B5EF4-FFF2-40B4-BE49-F238E27FC236}">
-                <a16:creationId xmlns:a16="http://schemas.microsoft.com/office/drawing/2014/main" id="{08A2A707-0DA6-144D-A497-B3EF5F0CDEC3}"/>
-              </a:ext>
-            </a:extLst>
-          </p:cNvPr>
-          <p:cNvSpPr/>
-          <p:nvPr/>
-        </p:nvSpPr>
-        <p:spPr>
-          <a:xfrm>
-            <a:off x="7368732" y="3"/>
-            <a:ext cx="389850" cy="461665"/>
-          </a:xfrm>
-          <a:prstGeom prst="rect">
-            <a:avLst/>
-          </a:prstGeom>
-        </p:spPr>
-        <p:txBody>
-          <a:bodyPr wrap="none">
-            <a:spAutoFit/>
-          </a:bodyPr>
-          <a:lstStyle/>
-          <a:p>
-            <a:r>
-              <a:rPr lang="en-US" sz="2400" dirty="0">
-                <a:latin typeface="Arial" panose="020B0604020202020204" pitchFamily="34" charset="0"/>
-                <a:cs typeface="Arial" panose="020B0604020202020204" pitchFamily="34" charset="0"/>
-              </a:rPr>
-              <a:t>B</a:t>
-            </a:r>
-          </a:p>
-        </p:txBody>
-      </p:sp>
-      <p:sp>
-        <p:nvSpPr>
-          <p:cNvPr id="14" name="Rectangle 13">
-            <a:extLst>
-              <a:ext uri="{FF2B5EF4-FFF2-40B4-BE49-F238E27FC236}">
-                <a16:creationId xmlns:a16="http://schemas.microsoft.com/office/drawing/2014/main" id="{5190FBE0-F6A7-124F-A482-538654A0A44F}"/>
-              </a:ext>
-            </a:extLst>
-          </p:cNvPr>
-          <p:cNvSpPr/>
-          <p:nvPr/>
-        </p:nvSpPr>
-        <p:spPr>
-          <a:xfrm>
-            <a:off x="7470332" y="3332418"/>
+            <a:off x="6663925" y="3064033"/>
             <a:ext cx="407484" cy="461665"/>
           </a:xfrm>
           <a:prstGeom prst="rect">
@@ -3282,7 +3208,7 @@
           </a:prstGeom>
         </p:spPr>
         <p:txBody>
-          <a:bodyPr wrap="none">
+          <a:bodyPr wrap="square">
             <a:spAutoFit/>
           </a:bodyPr>
           <a:lstStyle/>
@@ -3299,10 +3225,10 @@
       </p:sp>
       <p:grpSp>
         <p:nvGrpSpPr>
-          <p:cNvPr id="44" name="Group 43">
+          <p:cNvPr id="13" name="Group 12">
             <a:extLst>
               <a:ext uri="{FF2B5EF4-FFF2-40B4-BE49-F238E27FC236}">
-                <a16:creationId xmlns:a16="http://schemas.microsoft.com/office/drawing/2014/main" id="{0576D370-391C-2A49-B6F4-B465AF18C320}"/>
+                <a16:creationId xmlns:a16="http://schemas.microsoft.com/office/drawing/2014/main" id="{C44EE892-F7F8-1940-B721-0E628B110E9D}"/>
               </a:ext>
             </a:extLst>
           </p:cNvPr>
@@ -3311,950 +3237,7 @@
         </p:nvGrpSpPr>
         <p:grpSpPr>
           <a:xfrm>
-            <a:off x="198156" y="106017"/>
-            <a:ext cx="7063972" cy="6685724"/>
-            <a:chOff x="25879" y="212033"/>
-            <a:chExt cx="7063972" cy="6685724"/>
-          </a:xfrm>
-        </p:grpSpPr>
-        <p:pic>
-          <p:nvPicPr>
-            <p:cNvPr id="42" name="Picture 41">
-              <a:extLst>
-                <a:ext uri="{FF2B5EF4-FFF2-40B4-BE49-F238E27FC236}">
-                  <a16:creationId xmlns:a16="http://schemas.microsoft.com/office/drawing/2014/main" id="{01BF00F7-C2C1-A646-B5B9-0EEDD6B88743}"/>
-                </a:ext>
-              </a:extLst>
-            </p:cNvPr>
-            <p:cNvPicPr>
-              <a:picLocks noChangeAspect="1"/>
-            </p:cNvPicPr>
-            <p:nvPr/>
-          </p:nvPicPr>
-          <p:blipFill rotWithShape="1">
-            <a:blip r:embed="rId4"/>
-            <a:srcRect l="4244" t="2512"/>
-            <a:stretch/>
-          </p:blipFill>
-          <p:spPr>
-            <a:xfrm>
-              <a:off x="397564" y="212033"/>
-              <a:ext cx="6566891" cy="6685724"/>
-            </a:xfrm>
-            <a:prstGeom prst="rect">
-              <a:avLst/>
-            </a:prstGeom>
-          </p:spPr>
-        </p:pic>
-        <p:grpSp>
-          <p:nvGrpSpPr>
-            <p:cNvPr id="28" name="Group 27">
-              <a:extLst>
-                <a:ext uri="{FF2B5EF4-FFF2-40B4-BE49-F238E27FC236}">
-                  <a16:creationId xmlns:a16="http://schemas.microsoft.com/office/drawing/2014/main" id="{7292E23D-1E44-7445-9291-0D6E9669F9CA}"/>
-                </a:ext>
-              </a:extLst>
-            </p:cNvPr>
-            <p:cNvGrpSpPr/>
-            <p:nvPr/>
-          </p:nvGrpSpPr>
-          <p:grpSpPr>
-            <a:xfrm>
-              <a:off x="6059248" y="318265"/>
-              <a:ext cx="1030603" cy="646331"/>
-              <a:chOff x="5435100" y="566099"/>
-              <a:chExt cx="1030603" cy="646331"/>
-            </a:xfrm>
-          </p:grpSpPr>
-          <p:sp>
-            <p:nvSpPr>
-              <p:cNvPr id="21" name="TextBox 20">
-                <a:extLst>
-                  <a:ext uri="{FF2B5EF4-FFF2-40B4-BE49-F238E27FC236}">
-                    <a16:creationId xmlns:a16="http://schemas.microsoft.com/office/drawing/2014/main" id="{628E1381-2884-F644-9874-725805411EC1}"/>
-                  </a:ext>
-                </a:extLst>
-              </p:cNvPr>
-              <p:cNvSpPr txBox="1"/>
-              <p:nvPr/>
-            </p:nvSpPr>
-            <p:spPr>
-              <a:xfrm>
-                <a:off x="5435100" y="566099"/>
-                <a:ext cx="1030603" cy="646331"/>
-              </a:xfrm>
-              <a:prstGeom prst="rect">
-                <a:avLst/>
-              </a:prstGeom>
-              <a:solidFill>
-                <a:schemeClr val="bg1"/>
-              </a:solidFill>
-              <a:ln w="15875" cap="rnd">
-                <a:solidFill>
-                  <a:srgbClr val="D6D6D6"/>
-                </a:solidFill>
-              </a:ln>
-            </p:spPr>
-            <p:txBody>
-              <a:bodyPr wrap="none" rtlCol="0">
-                <a:spAutoFit/>
-              </a:bodyPr>
-              <a:lstStyle/>
-              <a:p>
-                <a:r>
-                  <a:rPr lang="en-US" sz="1200" dirty="0">
-                    <a:latin typeface="Arial" panose="020B0604020202020204" pitchFamily="34" charset="0"/>
-                    <a:cs typeface="Arial" panose="020B0604020202020204" pitchFamily="34" charset="0"/>
-                  </a:rPr>
-                  <a:t>     </a:t>
-                </a:r>
-                <a:r>
-                  <a:rPr lang="en-US" sz="1200" b="1" dirty="0">
-                    <a:latin typeface="Arial" panose="020B0604020202020204" pitchFamily="34" charset="0"/>
-                    <a:cs typeface="Arial" panose="020B0604020202020204" pitchFamily="34" charset="0"/>
-                  </a:rPr>
-                  <a:t>OC43</a:t>
-                </a:r>
-              </a:p>
-              <a:p>
-                <a:r>
-                  <a:rPr lang="en-US" sz="1200" dirty="0">
-                    <a:latin typeface="Arial" panose="020B0604020202020204" pitchFamily="34" charset="0"/>
-                    <a:cs typeface="Arial" panose="020B0604020202020204" pitchFamily="34" charset="0"/>
-                  </a:rPr>
-                  <a:t>     lineage A</a:t>
-                </a:r>
-              </a:p>
-              <a:p>
-                <a:r>
-                  <a:rPr lang="en-US" sz="1200" dirty="0">
-                    <a:latin typeface="Arial" panose="020B0604020202020204" pitchFamily="34" charset="0"/>
-                    <a:cs typeface="Arial" panose="020B0604020202020204" pitchFamily="34" charset="0"/>
-                  </a:rPr>
-                  <a:t>     lineage B</a:t>
-                </a:r>
-              </a:p>
-            </p:txBody>
-          </p:sp>
-          <p:sp>
-            <p:nvSpPr>
-              <p:cNvPr id="26" name="Oval 25">
-                <a:extLst>
-                  <a:ext uri="{FF2B5EF4-FFF2-40B4-BE49-F238E27FC236}">
-                    <a16:creationId xmlns:a16="http://schemas.microsoft.com/office/drawing/2014/main" id="{6CF25D4C-FD7E-8844-9F12-62E3A316EDBA}"/>
-                  </a:ext>
-                </a:extLst>
-              </p:cNvPr>
-              <p:cNvSpPr/>
-              <p:nvPr/>
-            </p:nvSpPr>
-            <p:spPr>
-              <a:xfrm>
-                <a:off x="5513696" y="804537"/>
-                <a:ext cx="146304" cy="146304"/>
-              </a:xfrm>
-              <a:prstGeom prst="ellipse">
-                <a:avLst/>
-              </a:prstGeom>
-              <a:solidFill>
-                <a:srgbClr val="CB4335"/>
-              </a:solidFill>
-              <a:ln>
-                <a:noFill/>
-              </a:ln>
-            </p:spPr>
-            <p:style>
-              <a:lnRef idx="2">
-                <a:schemeClr val="accent1">
-                  <a:shade val="50000"/>
-                </a:schemeClr>
-              </a:lnRef>
-              <a:fillRef idx="1">
-                <a:schemeClr val="accent1"/>
-              </a:fillRef>
-              <a:effectRef idx="0">
-                <a:schemeClr val="accent1"/>
-              </a:effectRef>
-              <a:fontRef idx="minor">
-                <a:schemeClr val="lt1"/>
-              </a:fontRef>
-            </p:style>
-            <p:txBody>
-              <a:bodyPr rot="0" spcFirstLastPara="0" vertOverflow="overflow" horzOverflow="overflow" vert="horz" wrap="square" lIns="91440" tIns="45720" rIns="91440" bIns="45720" numCol="1" spcCol="0" rtlCol="0" fromWordArt="0" anchor="ctr" anchorCtr="0" forceAA="0" compatLnSpc="1">
-                <a:prstTxWarp prst="textNoShape">
-                  <a:avLst/>
-                </a:prstTxWarp>
-                <a:noAutofit/>
-              </a:bodyPr>
-              <a:lstStyle/>
-              <a:p>
-                <a:pPr algn="ctr"/>
-                <a:endParaRPr lang="en-US"/>
-              </a:p>
-            </p:txBody>
-          </p:sp>
-          <p:sp>
-            <p:nvSpPr>
-              <p:cNvPr id="27" name="Oval 26">
-                <a:extLst>
-                  <a:ext uri="{FF2B5EF4-FFF2-40B4-BE49-F238E27FC236}">
-                    <a16:creationId xmlns:a16="http://schemas.microsoft.com/office/drawing/2014/main" id="{DF395EEC-9B5F-FB47-85A4-715D2F744103}"/>
-                  </a:ext>
-                </a:extLst>
-              </p:cNvPr>
-              <p:cNvSpPr/>
-              <p:nvPr/>
-            </p:nvSpPr>
-            <p:spPr>
-              <a:xfrm>
-                <a:off x="5513696" y="995918"/>
-                <a:ext cx="146304" cy="146304"/>
-              </a:xfrm>
-              <a:prstGeom prst="ellipse">
-                <a:avLst/>
-              </a:prstGeom>
-              <a:solidFill>
-                <a:srgbClr val="FF9A00"/>
-              </a:solidFill>
-              <a:ln>
-                <a:noFill/>
-              </a:ln>
-            </p:spPr>
-            <p:style>
-              <a:lnRef idx="2">
-                <a:schemeClr val="accent1">
-                  <a:shade val="50000"/>
-                </a:schemeClr>
-              </a:lnRef>
-              <a:fillRef idx="1">
-                <a:schemeClr val="accent1"/>
-              </a:fillRef>
-              <a:effectRef idx="0">
-                <a:schemeClr val="accent1"/>
-              </a:effectRef>
-              <a:fontRef idx="minor">
-                <a:schemeClr val="lt1"/>
-              </a:fontRef>
-            </p:style>
-            <p:txBody>
-              <a:bodyPr rot="0" spcFirstLastPara="0" vertOverflow="overflow" horzOverflow="overflow" vert="horz" wrap="square" lIns="91440" tIns="45720" rIns="91440" bIns="45720" numCol="1" spcCol="0" rtlCol="0" fromWordArt="0" anchor="ctr" anchorCtr="0" forceAA="0" compatLnSpc="1">
-                <a:prstTxWarp prst="textNoShape">
-                  <a:avLst/>
-                </a:prstTxWarp>
-                <a:noAutofit/>
-              </a:bodyPr>
-              <a:lstStyle/>
-              <a:p>
-                <a:pPr algn="ctr"/>
-                <a:endParaRPr lang="en-US"/>
-              </a:p>
-            </p:txBody>
-          </p:sp>
-        </p:grpSp>
-        <p:grpSp>
-          <p:nvGrpSpPr>
-            <p:cNvPr id="29" name="Group 28">
-              <a:extLst>
-                <a:ext uri="{FF2B5EF4-FFF2-40B4-BE49-F238E27FC236}">
-                  <a16:creationId xmlns:a16="http://schemas.microsoft.com/office/drawing/2014/main" id="{8DC5F1E0-1223-A841-BE67-3D6B9040EDC1}"/>
-                </a:ext>
-              </a:extLst>
-            </p:cNvPr>
-            <p:cNvGrpSpPr/>
-            <p:nvPr/>
-          </p:nvGrpSpPr>
-          <p:grpSpPr>
-            <a:xfrm>
-              <a:off x="6059247" y="3556145"/>
-              <a:ext cx="1030603" cy="646331"/>
-              <a:chOff x="5435100" y="566099"/>
-              <a:chExt cx="1030603" cy="646331"/>
-            </a:xfrm>
-          </p:grpSpPr>
-          <p:sp>
-            <p:nvSpPr>
-              <p:cNvPr id="30" name="TextBox 29">
-                <a:extLst>
-                  <a:ext uri="{FF2B5EF4-FFF2-40B4-BE49-F238E27FC236}">
-                    <a16:creationId xmlns:a16="http://schemas.microsoft.com/office/drawing/2014/main" id="{8CFDA676-6211-CB4A-8169-800489826B7E}"/>
-                  </a:ext>
-                </a:extLst>
-              </p:cNvPr>
-              <p:cNvSpPr txBox="1"/>
-              <p:nvPr/>
-            </p:nvSpPr>
-            <p:spPr>
-              <a:xfrm>
-                <a:off x="5435100" y="566099"/>
-                <a:ext cx="1030603" cy="646331"/>
-              </a:xfrm>
-              <a:prstGeom prst="rect">
-                <a:avLst/>
-              </a:prstGeom>
-              <a:solidFill>
-                <a:schemeClr val="bg1"/>
-              </a:solidFill>
-              <a:ln w="15875" cap="rnd">
-                <a:solidFill>
-                  <a:srgbClr val="D6D6D6"/>
-                </a:solidFill>
-              </a:ln>
-            </p:spPr>
-            <p:txBody>
-              <a:bodyPr wrap="none" rtlCol="0">
-                <a:spAutoFit/>
-              </a:bodyPr>
-              <a:lstStyle/>
-              <a:p>
-                <a:r>
-                  <a:rPr lang="en-US" sz="1200" dirty="0">
-                    <a:latin typeface="Arial" panose="020B0604020202020204" pitchFamily="34" charset="0"/>
-                    <a:cs typeface="Arial" panose="020B0604020202020204" pitchFamily="34" charset="0"/>
-                  </a:rPr>
-                  <a:t>     </a:t>
-                </a:r>
-                <a:r>
-                  <a:rPr lang="en-US" sz="1200" b="1" dirty="0">
-                    <a:latin typeface="Arial" panose="020B0604020202020204" pitchFamily="34" charset="0"/>
-                    <a:cs typeface="Arial" panose="020B0604020202020204" pitchFamily="34" charset="0"/>
-                  </a:rPr>
-                  <a:t>HKU1</a:t>
-                </a:r>
-              </a:p>
-              <a:p>
-                <a:r>
-                  <a:rPr lang="en-US" sz="1200" dirty="0">
-                    <a:latin typeface="Arial" panose="020B0604020202020204" pitchFamily="34" charset="0"/>
-                    <a:cs typeface="Arial" panose="020B0604020202020204" pitchFamily="34" charset="0"/>
-                  </a:rPr>
-                  <a:t>     lineage A</a:t>
-                </a:r>
-              </a:p>
-              <a:p>
-                <a:r>
-                  <a:rPr lang="en-US" sz="1200" dirty="0">
-                    <a:latin typeface="Arial" panose="020B0604020202020204" pitchFamily="34" charset="0"/>
-                    <a:cs typeface="Arial" panose="020B0604020202020204" pitchFamily="34" charset="0"/>
-                  </a:rPr>
-                  <a:t>     lineage B</a:t>
-                </a:r>
-              </a:p>
-            </p:txBody>
-          </p:sp>
-          <p:sp>
-            <p:nvSpPr>
-              <p:cNvPr id="31" name="Oval 30">
-                <a:extLst>
-                  <a:ext uri="{FF2B5EF4-FFF2-40B4-BE49-F238E27FC236}">
-                    <a16:creationId xmlns:a16="http://schemas.microsoft.com/office/drawing/2014/main" id="{65209162-1AAD-324D-A434-90A61FE9E266}"/>
-                  </a:ext>
-                </a:extLst>
-              </p:cNvPr>
-              <p:cNvSpPr/>
-              <p:nvPr/>
-            </p:nvSpPr>
-            <p:spPr>
-              <a:xfrm>
-                <a:off x="5513696" y="831041"/>
-                <a:ext cx="146304" cy="146304"/>
-              </a:xfrm>
-              <a:prstGeom prst="ellipse">
-                <a:avLst/>
-              </a:prstGeom>
-              <a:solidFill>
-                <a:srgbClr val="7C5295"/>
-              </a:solidFill>
-              <a:ln>
-                <a:noFill/>
-              </a:ln>
-            </p:spPr>
-            <p:style>
-              <a:lnRef idx="2">
-                <a:schemeClr val="accent1">
-                  <a:shade val="50000"/>
-                </a:schemeClr>
-              </a:lnRef>
-              <a:fillRef idx="1">
-                <a:schemeClr val="accent1"/>
-              </a:fillRef>
-              <a:effectRef idx="0">
-                <a:schemeClr val="accent1"/>
-              </a:effectRef>
-              <a:fontRef idx="minor">
-                <a:schemeClr val="lt1"/>
-              </a:fontRef>
-            </p:style>
-            <p:txBody>
-              <a:bodyPr rot="0" spcFirstLastPara="0" vertOverflow="overflow" horzOverflow="overflow" vert="horz" wrap="square" lIns="91440" tIns="45720" rIns="91440" bIns="45720" numCol="1" spcCol="0" rtlCol="0" fromWordArt="0" anchor="ctr" anchorCtr="0" forceAA="0" compatLnSpc="1">
-                <a:prstTxWarp prst="textNoShape">
-                  <a:avLst/>
-                </a:prstTxWarp>
-                <a:noAutofit/>
-              </a:bodyPr>
-              <a:lstStyle/>
-              <a:p>
-                <a:pPr algn="ctr"/>
-                <a:endParaRPr lang="en-US"/>
-              </a:p>
-            </p:txBody>
-          </p:sp>
-          <p:sp>
-            <p:nvSpPr>
-              <p:cNvPr id="32" name="Oval 31">
-                <a:extLst>
-                  <a:ext uri="{FF2B5EF4-FFF2-40B4-BE49-F238E27FC236}">
-                    <a16:creationId xmlns:a16="http://schemas.microsoft.com/office/drawing/2014/main" id="{C6EC993F-F20E-9249-8E1F-C60BFAAC7357}"/>
-                  </a:ext>
-                </a:extLst>
-              </p:cNvPr>
-              <p:cNvSpPr/>
-              <p:nvPr/>
-            </p:nvSpPr>
-            <p:spPr>
-              <a:xfrm>
-                <a:off x="5513696" y="1022422"/>
-                <a:ext cx="146304" cy="146304"/>
-              </a:xfrm>
-              <a:prstGeom prst="ellipse">
-                <a:avLst/>
-              </a:prstGeom>
-              <a:solidFill>
-                <a:srgbClr val="B491C9"/>
-              </a:solidFill>
-              <a:ln>
-                <a:noFill/>
-              </a:ln>
-            </p:spPr>
-            <p:style>
-              <a:lnRef idx="2">
-                <a:schemeClr val="accent1">
-                  <a:shade val="50000"/>
-                </a:schemeClr>
-              </a:lnRef>
-              <a:fillRef idx="1">
-                <a:schemeClr val="accent1"/>
-              </a:fillRef>
-              <a:effectRef idx="0">
-                <a:schemeClr val="accent1"/>
-              </a:effectRef>
-              <a:fontRef idx="minor">
-                <a:schemeClr val="lt1"/>
-              </a:fontRef>
-            </p:style>
-            <p:txBody>
-              <a:bodyPr rot="0" spcFirstLastPara="0" vertOverflow="overflow" horzOverflow="overflow" vert="horz" wrap="square" lIns="91440" tIns="45720" rIns="91440" bIns="45720" numCol="1" spcCol="0" rtlCol="0" fromWordArt="0" anchor="ctr" anchorCtr="0" forceAA="0" compatLnSpc="1">
-                <a:prstTxWarp prst="textNoShape">
-                  <a:avLst/>
-                </a:prstTxWarp>
-                <a:noAutofit/>
-              </a:bodyPr>
-              <a:lstStyle/>
-              <a:p>
-                <a:pPr algn="ctr"/>
-                <a:endParaRPr lang="en-US"/>
-              </a:p>
-            </p:txBody>
-          </p:sp>
-        </p:grpSp>
-        <p:grpSp>
-          <p:nvGrpSpPr>
-            <p:cNvPr id="33" name="Group 32">
-              <a:extLst>
-                <a:ext uri="{FF2B5EF4-FFF2-40B4-BE49-F238E27FC236}">
-                  <a16:creationId xmlns:a16="http://schemas.microsoft.com/office/drawing/2014/main" id="{338064FC-BA0F-8C4A-8D18-606A1A637A68}"/>
-                </a:ext>
-              </a:extLst>
-            </p:cNvPr>
-            <p:cNvGrpSpPr/>
-            <p:nvPr/>
-          </p:nvGrpSpPr>
-          <p:grpSpPr>
-            <a:xfrm>
-              <a:off x="6059246" y="1970251"/>
-              <a:ext cx="758541" cy="276999"/>
-              <a:chOff x="5435100" y="566099"/>
-              <a:chExt cx="758541" cy="276999"/>
-            </a:xfrm>
-          </p:grpSpPr>
-          <p:sp>
-            <p:nvSpPr>
-              <p:cNvPr id="34" name="TextBox 33">
-                <a:extLst>
-                  <a:ext uri="{FF2B5EF4-FFF2-40B4-BE49-F238E27FC236}">
-                    <a16:creationId xmlns:a16="http://schemas.microsoft.com/office/drawing/2014/main" id="{47DC01C0-E2F6-234A-9C7D-B1A3FA170357}"/>
-                  </a:ext>
-                </a:extLst>
-              </p:cNvPr>
-              <p:cNvSpPr txBox="1"/>
-              <p:nvPr/>
-            </p:nvSpPr>
-            <p:spPr>
-              <a:xfrm>
-                <a:off x="5435100" y="566099"/>
-                <a:ext cx="758541" cy="276999"/>
-              </a:xfrm>
-              <a:prstGeom prst="rect">
-                <a:avLst/>
-              </a:prstGeom>
-              <a:solidFill>
-                <a:schemeClr val="bg1"/>
-              </a:solidFill>
-              <a:ln w="15875" cap="rnd">
-                <a:solidFill>
-                  <a:srgbClr val="D6D6D6"/>
-                </a:solidFill>
-              </a:ln>
-            </p:spPr>
-            <p:txBody>
-              <a:bodyPr wrap="none" rtlCol="0">
-                <a:spAutoFit/>
-              </a:bodyPr>
-              <a:lstStyle/>
-              <a:p>
-                <a:r>
-                  <a:rPr lang="en-US" sz="1200" dirty="0">
-                    <a:latin typeface="Arial" panose="020B0604020202020204" pitchFamily="34" charset="0"/>
-                    <a:cs typeface="Arial" panose="020B0604020202020204" pitchFamily="34" charset="0"/>
-                  </a:rPr>
-                  <a:t>     </a:t>
-                </a:r>
-                <a:r>
-                  <a:rPr lang="en-US" sz="1200" b="1" dirty="0">
-                    <a:latin typeface="Arial" panose="020B0604020202020204" pitchFamily="34" charset="0"/>
-                    <a:cs typeface="Arial" panose="020B0604020202020204" pitchFamily="34" charset="0"/>
-                  </a:rPr>
-                  <a:t>229E</a:t>
-                </a:r>
-              </a:p>
-            </p:txBody>
-          </p:sp>
-          <p:sp>
-            <p:nvSpPr>
-              <p:cNvPr id="35" name="Oval 34">
-                <a:extLst>
-                  <a:ext uri="{FF2B5EF4-FFF2-40B4-BE49-F238E27FC236}">
-                    <a16:creationId xmlns:a16="http://schemas.microsoft.com/office/drawing/2014/main" id="{709C62B6-FEA5-104C-AA58-50BAFA341172}"/>
-                  </a:ext>
-                </a:extLst>
-              </p:cNvPr>
-              <p:cNvSpPr/>
-              <p:nvPr/>
-            </p:nvSpPr>
-            <p:spPr>
-              <a:xfrm>
-                <a:off x="5513696" y="632261"/>
-                <a:ext cx="146304" cy="146304"/>
-              </a:xfrm>
-              <a:prstGeom prst="ellipse">
-                <a:avLst/>
-              </a:prstGeom>
-              <a:solidFill>
-                <a:srgbClr val="2E86C1"/>
-              </a:solidFill>
-              <a:ln>
-                <a:noFill/>
-              </a:ln>
-            </p:spPr>
-            <p:style>
-              <a:lnRef idx="2">
-                <a:schemeClr val="accent1">
-                  <a:shade val="50000"/>
-                </a:schemeClr>
-              </a:lnRef>
-              <a:fillRef idx="1">
-                <a:schemeClr val="accent1"/>
-              </a:fillRef>
-              <a:effectRef idx="0">
-                <a:schemeClr val="accent1"/>
-              </a:effectRef>
-              <a:fontRef idx="minor">
-                <a:schemeClr val="lt1"/>
-              </a:fontRef>
-            </p:style>
-            <p:txBody>
-              <a:bodyPr rot="0" spcFirstLastPara="0" vertOverflow="overflow" horzOverflow="overflow" vert="horz" wrap="square" lIns="91440" tIns="45720" rIns="91440" bIns="45720" numCol="1" spcCol="0" rtlCol="0" fromWordArt="0" anchor="ctr" anchorCtr="0" forceAA="0" compatLnSpc="1">
-                <a:prstTxWarp prst="textNoShape">
-                  <a:avLst/>
-                </a:prstTxWarp>
-                <a:noAutofit/>
-              </a:bodyPr>
-              <a:lstStyle/>
-              <a:p>
-                <a:pPr algn="ctr"/>
-                <a:endParaRPr lang="en-US"/>
-              </a:p>
-            </p:txBody>
-          </p:sp>
-        </p:grpSp>
-        <p:grpSp>
-          <p:nvGrpSpPr>
-            <p:cNvPr id="37" name="Group 36">
-              <a:extLst>
-                <a:ext uri="{FF2B5EF4-FFF2-40B4-BE49-F238E27FC236}">
-                  <a16:creationId xmlns:a16="http://schemas.microsoft.com/office/drawing/2014/main" id="{E8C22B33-2749-3447-ABC3-C9CFA68D58FE}"/>
-                </a:ext>
-              </a:extLst>
-            </p:cNvPr>
-            <p:cNvGrpSpPr/>
-            <p:nvPr/>
-          </p:nvGrpSpPr>
-          <p:grpSpPr>
-            <a:xfrm>
-              <a:off x="6059246" y="5186735"/>
-              <a:ext cx="1030603" cy="646331"/>
-              <a:chOff x="5435100" y="566099"/>
-              <a:chExt cx="1030603" cy="646331"/>
-            </a:xfrm>
-          </p:grpSpPr>
-          <p:sp>
-            <p:nvSpPr>
-              <p:cNvPr id="38" name="TextBox 37">
-                <a:extLst>
-                  <a:ext uri="{FF2B5EF4-FFF2-40B4-BE49-F238E27FC236}">
-                    <a16:creationId xmlns:a16="http://schemas.microsoft.com/office/drawing/2014/main" id="{46B865BF-DC7D-C34B-82AF-29FD99B00231}"/>
-                  </a:ext>
-                </a:extLst>
-              </p:cNvPr>
-              <p:cNvSpPr txBox="1"/>
-              <p:nvPr/>
-            </p:nvSpPr>
-            <p:spPr>
-              <a:xfrm>
-                <a:off x="5435100" y="566099"/>
-                <a:ext cx="1030603" cy="646331"/>
-              </a:xfrm>
-              <a:prstGeom prst="rect">
-                <a:avLst/>
-              </a:prstGeom>
-              <a:solidFill>
-                <a:schemeClr val="bg1"/>
-              </a:solidFill>
-              <a:ln w="15875" cap="rnd">
-                <a:solidFill>
-                  <a:srgbClr val="D6D6D6"/>
-                </a:solidFill>
-              </a:ln>
-            </p:spPr>
-            <p:txBody>
-              <a:bodyPr wrap="none" rtlCol="0">
-                <a:spAutoFit/>
-              </a:bodyPr>
-              <a:lstStyle/>
-              <a:p>
-                <a:r>
-                  <a:rPr lang="en-US" sz="1200" dirty="0">
-                    <a:latin typeface="Arial" panose="020B0604020202020204" pitchFamily="34" charset="0"/>
-                    <a:cs typeface="Arial" panose="020B0604020202020204" pitchFamily="34" charset="0"/>
-                  </a:rPr>
-                  <a:t>     </a:t>
-                </a:r>
-                <a:r>
-                  <a:rPr lang="en-US" sz="1200" b="1" dirty="0">
-                    <a:latin typeface="Arial" panose="020B0604020202020204" pitchFamily="34" charset="0"/>
-                    <a:cs typeface="Arial" panose="020B0604020202020204" pitchFamily="34" charset="0"/>
-                  </a:rPr>
-                  <a:t>NL63</a:t>
-                </a:r>
-              </a:p>
-              <a:p>
-                <a:r>
-                  <a:rPr lang="en-US" sz="1200" dirty="0">
-                    <a:latin typeface="Arial" panose="020B0604020202020204" pitchFamily="34" charset="0"/>
-                    <a:cs typeface="Arial" panose="020B0604020202020204" pitchFamily="34" charset="0"/>
-                  </a:rPr>
-                  <a:t>     lineage A</a:t>
-                </a:r>
-              </a:p>
-              <a:p>
-                <a:r>
-                  <a:rPr lang="en-US" sz="1200" dirty="0">
-                    <a:latin typeface="Arial" panose="020B0604020202020204" pitchFamily="34" charset="0"/>
-                    <a:cs typeface="Arial" panose="020B0604020202020204" pitchFamily="34" charset="0"/>
-                  </a:rPr>
-                  <a:t>     lineage B</a:t>
-                </a:r>
-              </a:p>
-            </p:txBody>
-          </p:sp>
-          <p:sp>
-            <p:nvSpPr>
-              <p:cNvPr id="39" name="Oval 38">
-                <a:extLst>
-                  <a:ext uri="{FF2B5EF4-FFF2-40B4-BE49-F238E27FC236}">
-                    <a16:creationId xmlns:a16="http://schemas.microsoft.com/office/drawing/2014/main" id="{82236492-BC16-2D4B-BCDC-1C8458A428F7}"/>
-                  </a:ext>
-                </a:extLst>
-              </p:cNvPr>
-              <p:cNvSpPr/>
-              <p:nvPr/>
-            </p:nvSpPr>
-            <p:spPr>
-              <a:xfrm>
-                <a:off x="5513696" y="817791"/>
-                <a:ext cx="146304" cy="146304"/>
-              </a:xfrm>
-              <a:prstGeom prst="ellipse">
-                <a:avLst/>
-              </a:prstGeom>
-              <a:solidFill>
-                <a:srgbClr val="009888"/>
-              </a:solidFill>
-              <a:ln>
-                <a:noFill/>
-              </a:ln>
-            </p:spPr>
-            <p:style>
-              <a:lnRef idx="2">
-                <a:schemeClr val="accent1">
-                  <a:shade val="50000"/>
-                </a:schemeClr>
-              </a:lnRef>
-              <a:fillRef idx="1">
-                <a:schemeClr val="accent1"/>
-              </a:fillRef>
-              <a:effectRef idx="0">
-                <a:schemeClr val="accent1"/>
-              </a:effectRef>
-              <a:fontRef idx="minor">
-                <a:schemeClr val="lt1"/>
-              </a:fontRef>
-            </p:style>
-            <p:txBody>
-              <a:bodyPr rot="0" spcFirstLastPara="0" vertOverflow="overflow" horzOverflow="overflow" vert="horz" wrap="square" lIns="91440" tIns="45720" rIns="91440" bIns="45720" numCol="1" spcCol="0" rtlCol="0" fromWordArt="0" anchor="ctr" anchorCtr="0" forceAA="0" compatLnSpc="1">
-                <a:prstTxWarp prst="textNoShape">
-                  <a:avLst/>
-                </a:prstTxWarp>
-                <a:noAutofit/>
-              </a:bodyPr>
-              <a:lstStyle/>
-              <a:p>
-                <a:pPr algn="ctr"/>
-                <a:endParaRPr lang="en-US"/>
-              </a:p>
-            </p:txBody>
-          </p:sp>
-          <p:sp>
-            <p:nvSpPr>
-              <p:cNvPr id="40" name="Oval 39">
-                <a:extLst>
-                  <a:ext uri="{FF2B5EF4-FFF2-40B4-BE49-F238E27FC236}">
-                    <a16:creationId xmlns:a16="http://schemas.microsoft.com/office/drawing/2014/main" id="{B26DF4B9-FEA2-9A4D-BA7E-7588C7F3FB0A}"/>
-                  </a:ext>
-                </a:extLst>
-              </p:cNvPr>
-              <p:cNvSpPr/>
-              <p:nvPr/>
-            </p:nvSpPr>
-            <p:spPr>
-              <a:xfrm>
-                <a:off x="5513696" y="1009172"/>
-                <a:ext cx="146304" cy="146304"/>
-              </a:xfrm>
-              <a:prstGeom prst="ellipse">
-                <a:avLst/>
-              </a:prstGeom>
-              <a:solidFill>
-                <a:srgbClr val="87C735"/>
-              </a:solidFill>
-              <a:ln>
-                <a:noFill/>
-              </a:ln>
-            </p:spPr>
-            <p:style>
-              <a:lnRef idx="2">
-                <a:schemeClr val="accent1">
-                  <a:shade val="50000"/>
-                </a:schemeClr>
-              </a:lnRef>
-              <a:fillRef idx="1">
-                <a:schemeClr val="accent1"/>
-              </a:fillRef>
-              <a:effectRef idx="0">
-                <a:schemeClr val="accent1"/>
-              </a:effectRef>
-              <a:fontRef idx="minor">
-                <a:schemeClr val="lt1"/>
-              </a:fontRef>
-            </p:style>
-            <p:txBody>
-              <a:bodyPr rot="0" spcFirstLastPara="0" vertOverflow="overflow" horzOverflow="overflow" vert="horz" wrap="square" lIns="91440" tIns="45720" rIns="91440" bIns="45720" numCol="1" spcCol="0" rtlCol="0" fromWordArt="0" anchor="ctr" anchorCtr="0" forceAA="0" compatLnSpc="1">
-                <a:prstTxWarp prst="textNoShape">
-                  <a:avLst/>
-                </a:prstTxWarp>
-                <a:noAutofit/>
-              </a:bodyPr>
-              <a:lstStyle/>
-              <a:p>
-                <a:pPr algn="ctr"/>
-                <a:endParaRPr lang="en-US"/>
-              </a:p>
-            </p:txBody>
-          </p:sp>
-        </p:grpSp>
-        <p:sp>
-          <p:nvSpPr>
-            <p:cNvPr id="43" name="Rectangle 42">
-              <a:extLst>
-                <a:ext uri="{FF2B5EF4-FFF2-40B4-BE49-F238E27FC236}">
-                  <a16:creationId xmlns:a16="http://schemas.microsoft.com/office/drawing/2014/main" id="{F3FB433D-BC81-E741-91D3-4DCB645F6D51}"/>
-                </a:ext>
-              </a:extLst>
-            </p:cNvPr>
-            <p:cNvSpPr/>
-            <p:nvPr/>
-          </p:nvSpPr>
-          <p:spPr>
-            <a:xfrm rot="16200000">
-              <a:off x="-1196571" y="3149062"/>
-              <a:ext cx="2752677" cy="307777"/>
-            </a:xfrm>
-            <a:prstGeom prst="rect">
-              <a:avLst/>
-            </a:prstGeom>
-          </p:spPr>
-          <p:txBody>
-            <a:bodyPr wrap="none">
-              <a:spAutoFit/>
-            </a:bodyPr>
-            <a:lstStyle/>
-            <a:p>
-              <a:r>
-                <a:rPr lang="en-US" sz="1400" dirty="0">
-                  <a:latin typeface="Arial" panose="020B0604020202020204" pitchFamily="34" charset="0"/>
-                  <a:cs typeface="Arial" panose="020B0604020202020204" pitchFamily="34" charset="0"/>
-                </a:rPr>
-                <a:t>Amino acid substitutions per site</a:t>
-              </a:r>
-            </a:p>
-          </p:txBody>
-        </p:sp>
-      </p:grpSp>
-      <p:sp>
-        <p:nvSpPr>
-          <p:cNvPr id="45" name="Rectangle 44">
-            <a:extLst>
-              <a:ext uri="{FF2B5EF4-FFF2-40B4-BE49-F238E27FC236}">
-                <a16:creationId xmlns:a16="http://schemas.microsoft.com/office/drawing/2014/main" id="{6897F3FE-137D-BB4B-8A37-69F1DABF5D0B}"/>
-              </a:ext>
-            </a:extLst>
-          </p:cNvPr>
-          <p:cNvSpPr/>
-          <p:nvPr/>
-        </p:nvSpPr>
-        <p:spPr>
-          <a:xfrm>
-            <a:off x="2442806" y="6550223"/>
-            <a:ext cx="2215671" cy="307777"/>
-          </a:xfrm>
-          <a:prstGeom prst="rect">
-            <a:avLst/>
-          </a:prstGeom>
-        </p:spPr>
-        <p:txBody>
-          <a:bodyPr wrap="none">
-            <a:spAutoFit/>
-          </a:bodyPr>
-          <a:lstStyle/>
-          <a:p>
-            <a:r>
-              <a:rPr lang="en-US" sz="1400" dirty="0">
-                <a:latin typeface="Arial" panose="020B0604020202020204" pitchFamily="34" charset="0"/>
-                <a:cs typeface="Arial" panose="020B0604020202020204" pitchFamily="34" charset="0"/>
-              </a:rPr>
-              <a:t>Spike amino acid position</a:t>
-            </a:r>
-          </a:p>
-        </p:txBody>
-      </p:sp>
-      <p:sp>
-        <p:nvSpPr>
-          <p:cNvPr id="46" name="Rectangle 45">
-            <a:extLst>
-              <a:ext uri="{FF2B5EF4-FFF2-40B4-BE49-F238E27FC236}">
-                <a16:creationId xmlns:a16="http://schemas.microsoft.com/office/drawing/2014/main" id="{84632B36-9115-9442-93BE-D439F041EAD1}"/>
-              </a:ext>
-            </a:extLst>
-          </p:cNvPr>
-          <p:cNvSpPr/>
-          <p:nvPr/>
-        </p:nvSpPr>
-        <p:spPr>
-          <a:xfrm>
-            <a:off x="1934806" y="174496"/>
-            <a:ext cx="255198" cy="307777"/>
-          </a:xfrm>
-          <a:prstGeom prst="rect">
-            <a:avLst/>
-          </a:prstGeom>
-        </p:spPr>
-        <p:txBody>
-          <a:bodyPr wrap="none">
-            <a:spAutoFit/>
-          </a:bodyPr>
-          <a:lstStyle/>
-          <a:p>
-            <a:r>
-              <a:rPr lang="en-US" sz="1400" dirty="0">
-                <a:latin typeface="Arial" panose="020B0604020202020204" pitchFamily="34" charset="0"/>
-                <a:cs typeface="Arial" panose="020B0604020202020204" pitchFamily="34" charset="0"/>
-              </a:rPr>
-              <a:t>*</a:t>
-            </a:r>
-          </a:p>
-        </p:txBody>
-      </p:sp>
-      <p:sp>
-        <p:nvSpPr>
-          <p:cNvPr id="47" name="Rectangle 46">
-            <a:extLst>
-              <a:ext uri="{FF2B5EF4-FFF2-40B4-BE49-F238E27FC236}">
-                <a16:creationId xmlns:a16="http://schemas.microsoft.com/office/drawing/2014/main" id="{CD699A62-A1E9-6A49-9DF2-57509A7F2A84}"/>
-              </a:ext>
-            </a:extLst>
-          </p:cNvPr>
-          <p:cNvSpPr/>
-          <p:nvPr/>
-        </p:nvSpPr>
-        <p:spPr>
-          <a:xfrm>
-            <a:off x="1668106" y="720596"/>
-            <a:ext cx="774700" cy="307777"/>
-          </a:xfrm>
-          <a:prstGeom prst="rect">
-            <a:avLst/>
-          </a:prstGeom>
-        </p:spPr>
-        <p:txBody>
-          <a:bodyPr wrap="square">
-            <a:spAutoFit/>
-          </a:bodyPr>
-          <a:lstStyle/>
-          <a:p>
-            <a:r>
-              <a:rPr lang="en-US" sz="1400" dirty="0">
-                <a:latin typeface="Arial" panose="020B0604020202020204" pitchFamily="34" charset="0"/>
-                <a:cs typeface="Arial" panose="020B0604020202020204" pitchFamily="34" charset="0"/>
-              </a:rPr>
-              <a:t>*</a:t>
-            </a:r>
-          </a:p>
-        </p:txBody>
-      </p:sp>
-      <p:grpSp>
-        <p:nvGrpSpPr>
-          <p:cNvPr id="62" name="Group 61">
-            <a:extLst>
-              <a:ext uri="{FF2B5EF4-FFF2-40B4-BE49-F238E27FC236}">
-                <a16:creationId xmlns:a16="http://schemas.microsoft.com/office/drawing/2014/main" id="{0EB7635B-9BF4-3549-BD1B-EDD4C306B57A}"/>
-              </a:ext>
-            </a:extLst>
-          </p:cNvPr>
-          <p:cNvGrpSpPr/>
-          <p:nvPr/>
-        </p:nvGrpSpPr>
-        <p:grpSpPr>
-          <a:xfrm>
-            <a:off x="7718380" y="279313"/>
+            <a:off x="7021157" y="161056"/>
             <a:ext cx="2281394" cy="1015663"/>
             <a:chOff x="9375577" y="796000"/>
             <a:chExt cx="2281394" cy="1015663"/>
@@ -4262,10 +3245,10 @@
         </p:grpSpPr>
         <p:sp>
           <p:nvSpPr>
-            <p:cNvPr id="51" name="TextBox 50">
+            <p:cNvPr id="14" name="TextBox 13">
               <a:extLst>
                 <a:ext uri="{FF2B5EF4-FFF2-40B4-BE49-F238E27FC236}">
-                  <a16:creationId xmlns:a16="http://schemas.microsoft.com/office/drawing/2014/main" id="{8EA0E533-2A2C-C940-8F9D-62410FD6CD8E}"/>
+                  <a16:creationId xmlns:a16="http://schemas.microsoft.com/office/drawing/2014/main" id="{52D3FF4F-9EDD-9E4F-8519-D746986F03A4}"/>
                 </a:ext>
               </a:extLst>
             </p:cNvPr>
@@ -4350,10 +3333,10 @@
         </p:sp>
         <p:sp>
           <p:nvSpPr>
-            <p:cNvPr id="52" name="Oval 51">
+            <p:cNvPr id="15" name="Oval 14">
               <a:extLst>
                 <a:ext uri="{FF2B5EF4-FFF2-40B4-BE49-F238E27FC236}">
-                  <a16:creationId xmlns:a16="http://schemas.microsoft.com/office/drawing/2014/main" id="{86B0C2D9-3D9E-CA45-B68A-A254E4BC0D55}"/>
+                  <a16:creationId xmlns:a16="http://schemas.microsoft.com/office/drawing/2014/main" id="{59E7E36B-F81D-9246-96B2-D9F870BB5AFE}"/>
                 </a:ext>
               </a:extLst>
             </p:cNvPr>
@@ -4407,10 +3390,10 @@
         </p:sp>
         <p:sp>
           <p:nvSpPr>
-            <p:cNvPr id="53" name="Oval 52">
+            <p:cNvPr id="16" name="Oval 15">
               <a:extLst>
                 <a:ext uri="{FF2B5EF4-FFF2-40B4-BE49-F238E27FC236}">
-                  <a16:creationId xmlns:a16="http://schemas.microsoft.com/office/drawing/2014/main" id="{61AFB23E-733B-F842-9EFE-1BF5DE4D55D6}"/>
+                  <a16:creationId xmlns:a16="http://schemas.microsoft.com/office/drawing/2014/main" id="{58C96790-DF44-D24B-9CD5-5D1F0AE21A23}"/>
                 </a:ext>
               </a:extLst>
             </p:cNvPr>
@@ -4464,10 +3447,10 @@
         </p:sp>
         <p:sp>
           <p:nvSpPr>
-            <p:cNvPr id="59" name="Oval 58">
+            <p:cNvPr id="17" name="Oval 16">
               <a:extLst>
                 <a:ext uri="{FF2B5EF4-FFF2-40B4-BE49-F238E27FC236}">
-                  <a16:creationId xmlns:a16="http://schemas.microsoft.com/office/drawing/2014/main" id="{F85DAE1F-7F07-514A-B09C-685228EFB6C3}"/>
+                  <a16:creationId xmlns:a16="http://schemas.microsoft.com/office/drawing/2014/main" id="{E651CC2A-D900-A146-9E8D-7614788B63BC}"/>
                 </a:ext>
               </a:extLst>
             </p:cNvPr>
@@ -4521,10 +3504,10 @@
         </p:sp>
         <p:sp>
           <p:nvSpPr>
-            <p:cNvPr id="61" name="Oval 60">
+            <p:cNvPr id="18" name="Oval 17">
               <a:extLst>
                 <a:ext uri="{FF2B5EF4-FFF2-40B4-BE49-F238E27FC236}">
-                  <a16:creationId xmlns:a16="http://schemas.microsoft.com/office/drawing/2014/main" id="{66A4A23E-A9B3-BF4F-83BF-5761821B2C3F}"/>
+                  <a16:creationId xmlns:a16="http://schemas.microsoft.com/office/drawing/2014/main" id="{D8FA9659-2716-BF42-BAA1-88DDD2A8B5AF}"/>
                 </a:ext>
               </a:extLst>
             </p:cNvPr>
@@ -4579,10 +3562,10 @@
       </p:grpSp>
       <p:grpSp>
         <p:nvGrpSpPr>
-          <p:cNvPr id="71" name="Group 70">
+          <p:cNvPr id="19" name="Group 18">
             <a:extLst>
               <a:ext uri="{FF2B5EF4-FFF2-40B4-BE49-F238E27FC236}">
-                <a16:creationId xmlns:a16="http://schemas.microsoft.com/office/drawing/2014/main" id="{E95514AF-401A-2141-BD5F-369036FAD9DD}"/>
+                <a16:creationId xmlns:a16="http://schemas.microsoft.com/office/drawing/2014/main" id="{13081CF5-0861-0749-8E55-89C7145B32EE}"/>
               </a:ext>
             </a:extLst>
           </p:cNvPr>
@@ -4591,7 +3574,7 @@
         </p:nvGrpSpPr>
         <p:grpSpPr>
           <a:xfrm>
-            <a:off x="7685613" y="3743749"/>
+            <a:off x="6961094" y="3502660"/>
             <a:ext cx="2281394" cy="1200329"/>
             <a:chOff x="8879521" y="3999856"/>
             <a:chExt cx="2281394" cy="1200329"/>
@@ -4599,10 +3582,10 @@
         </p:grpSpPr>
         <p:grpSp>
           <p:nvGrpSpPr>
-            <p:cNvPr id="63" name="Group 62">
+            <p:cNvPr id="20" name="Group 19">
               <a:extLst>
                 <a:ext uri="{FF2B5EF4-FFF2-40B4-BE49-F238E27FC236}">
-                  <a16:creationId xmlns:a16="http://schemas.microsoft.com/office/drawing/2014/main" id="{77C36839-B9DB-3B40-B1B5-7247EF17069D}"/>
+                  <a16:creationId xmlns:a16="http://schemas.microsoft.com/office/drawing/2014/main" id="{0E8A7EDA-0BB1-EB46-BBA4-F967ED918B16}"/>
                 </a:ext>
               </a:extLst>
             </p:cNvPr>
@@ -4619,10 +3602,10 @@
           </p:grpSpPr>
           <p:sp>
             <p:nvSpPr>
-              <p:cNvPr id="64" name="TextBox 63">
+              <p:cNvPr id="22" name="TextBox 21">
                 <a:extLst>
                   <a:ext uri="{FF2B5EF4-FFF2-40B4-BE49-F238E27FC236}">
-                    <a16:creationId xmlns:a16="http://schemas.microsoft.com/office/drawing/2014/main" id="{368FC909-69A0-BF48-B3A6-C71B6E480E03}"/>
+                    <a16:creationId xmlns:a16="http://schemas.microsoft.com/office/drawing/2014/main" id="{9B73479C-0121-5446-B8BA-2B1FE8B20EE9}"/>
                   </a:ext>
                 </a:extLst>
               </p:cNvPr>
@@ -4716,10 +3699,10 @@
           </p:sp>
           <p:sp>
             <p:nvSpPr>
-              <p:cNvPr id="65" name="Oval 64">
+              <p:cNvPr id="23" name="Oval 22">
                 <a:extLst>
                   <a:ext uri="{FF2B5EF4-FFF2-40B4-BE49-F238E27FC236}">
-                    <a16:creationId xmlns:a16="http://schemas.microsoft.com/office/drawing/2014/main" id="{8355112E-10EE-4E45-B109-8D61549174F0}"/>
+                    <a16:creationId xmlns:a16="http://schemas.microsoft.com/office/drawing/2014/main" id="{5E454745-0CD3-8043-8169-D2CEA0425AB2}"/>
                   </a:ext>
                 </a:extLst>
               </p:cNvPr>
@@ -4773,10 +3756,10 @@
           </p:sp>
           <p:sp>
             <p:nvSpPr>
-              <p:cNvPr id="66" name="Oval 65">
+              <p:cNvPr id="24" name="Oval 23">
                 <a:extLst>
                   <a:ext uri="{FF2B5EF4-FFF2-40B4-BE49-F238E27FC236}">
-                    <a16:creationId xmlns:a16="http://schemas.microsoft.com/office/drawing/2014/main" id="{126BA9A1-F981-7B4E-9212-4D27143DBD36}"/>
+                    <a16:creationId xmlns:a16="http://schemas.microsoft.com/office/drawing/2014/main" id="{C0AD404E-9986-8A40-8603-9ECA6687FCCA}"/>
                   </a:ext>
                 </a:extLst>
               </p:cNvPr>
@@ -4830,10 +3813,10 @@
           </p:sp>
           <p:sp>
             <p:nvSpPr>
-              <p:cNvPr id="67" name="Oval 66">
+              <p:cNvPr id="25" name="Oval 24">
                 <a:extLst>
                   <a:ext uri="{FF2B5EF4-FFF2-40B4-BE49-F238E27FC236}">
-                    <a16:creationId xmlns:a16="http://schemas.microsoft.com/office/drawing/2014/main" id="{5F94BDE4-E104-624C-A708-6AD86AC8BAE0}"/>
+                    <a16:creationId xmlns:a16="http://schemas.microsoft.com/office/drawing/2014/main" id="{ADDFF2FD-0AC5-0041-B4F6-7B9898960B86}"/>
                   </a:ext>
                 </a:extLst>
               </p:cNvPr>
@@ -4887,10 +3870,10 @@
           </p:sp>
           <p:sp>
             <p:nvSpPr>
-              <p:cNvPr id="68" name="Oval 67">
+              <p:cNvPr id="26" name="Oval 25">
                 <a:extLst>
                   <a:ext uri="{FF2B5EF4-FFF2-40B4-BE49-F238E27FC236}">
-                    <a16:creationId xmlns:a16="http://schemas.microsoft.com/office/drawing/2014/main" id="{B5124D12-9F20-954F-8052-14C62A749924}"/>
+                    <a16:creationId xmlns:a16="http://schemas.microsoft.com/office/drawing/2014/main" id="{AD98A7E2-DB0E-AA46-8461-AB8725D7B53E}"/>
                   </a:ext>
                 </a:extLst>
               </p:cNvPr>
@@ -4945,10 +3928,10 @@
         </p:grpSp>
         <p:sp>
           <p:nvSpPr>
-            <p:cNvPr id="70" name="Oval 69">
+            <p:cNvPr id="21" name="Oval 20">
               <a:extLst>
                 <a:ext uri="{FF2B5EF4-FFF2-40B4-BE49-F238E27FC236}">
-                  <a16:creationId xmlns:a16="http://schemas.microsoft.com/office/drawing/2014/main" id="{D26518D9-8D4B-6A40-99A5-604302F4FF2C}"/>
+                  <a16:creationId xmlns:a16="http://schemas.microsoft.com/office/drawing/2014/main" id="{A2653014-5AB1-744F-8F72-47974D014525}"/>
                 </a:ext>
               </a:extLst>
             </p:cNvPr>
@@ -5003,10 +3986,10 @@
       </p:grpSp>
       <p:sp>
         <p:nvSpPr>
-          <p:cNvPr id="72" name="Rectangle 71">
+          <p:cNvPr id="27" name="Rectangle 26">
             <a:extLst>
               <a:ext uri="{FF2B5EF4-FFF2-40B4-BE49-F238E27FC236}">
-                <a16:creationId xmlns:a16="http://schemas.microsoft.com/office/drawing/2014/main" id="{34363AF1-A4C4-DF49-934B-5218086F2866}"/>
+                <a16:creationId xmlns:a16="http://schemas.microsoft.com/office/drawing/2014/main" id="{33B2A77A-F378-DA46-8DBA-4A9B94347BAA}"/>
               </a:ext>
             </a:extLst>
           </p:cNvPr>
@@ -5015,7 +3998,7 @@
         </p:nvSpPr>
         <p:spPr>
           <a:xfrm>
-            <a:off x="7957667" y="6562471"/>
+            <a:off x="7233148" y="6321382"/>
             <a:ext cx="4733988" cy="246221"/>
           </a:xfrm>
           <a:prstGeom prst="rect">
@@ -5023,7 +4006,7 @@
           </a:prstGeom>
         </p:spPr>
         <p:txBody>
-          <a:bodyPr wrap="none">
+          <a:bodyPr wrap="square">
             <a:spAutoFit/>
           </a:bodyPr>
           <a:lstStyle/>
@@ -5043,10 +4026,10 @@
       </p:sp>
       <p:sp>
         <p:nvSpPr>
-          <p:cNvPr id="73" name="Rectangle 72">
+          <p:cNvPr id="28" name="Rectangle 27">
             <a:extLst>
               <a:ext uri="{FF2B5EF4-FFF2-40B4-BE49-F238E27FC236}">
-                <a16:creationId xmlns:a16="http://schemas.microsoft.com/office/drawing/2014/main" id="{1BB79B0E-F6FD-D543-B3D7-A8FA2E60EEA8}"/>
+                <a16:creationId xmlns:a16="http://schemas.microsoft.com/office/drawing/2014/main" id="{BE424F56-8F25-D443-8D01-E359415CDBA6}"/>
               </a:ext>
             </a:extLst>
           </p:cNvPr>
@@ -5055,7 +4038,7 @@
         </p:nvSpPr>
         <p:spPr>
           <a:xfrm>
-            <a:off x="7957667" y="3066538"/>
+            <a:off x="7233148" y="2948281"/>
             <a:ext cx="4733988" cy="246221"/>
           </a:xfrm>
           <a:prstGeom prst="rect">
@@ -5063,7 +4046,7 @@
           </a:prstGeom>
         </p:spPr>
         <p:txBody>
-          <a:bodyPr wrap="none">
+          <a:bodyPr wrap="square">
             <a:spAutoFit/>
           </a:bodyPr>
           <a:lstStyle/>
@@ -5081,12 +4064,41 @@
           </a:p>
         </p:txBody>
       </p:sp>
-      <p:sp>
-        <p:nvSpPr>
-          <p:cNvPr id="74" name="Rectangle 73">
+      <p:pic>
+        <p:nvPicPr>
+          <p:cNvPr id="30" name="Picture 29">
             <a:extLst>
               <a:ext uri="{FF2B5EF4-FFF2-40B4-BE49-F238E27FC236}">
-                <a16:creationId xmlns:a16="http://schemas.microsoft.com/office/drawing/2014/main" id="{46A4AA81-35C1-4149-AFF2-943F8C44F1F1}"/>
+                <a16:creationId xmlns:a16="http://schemas.microsoft.com/office/drawing/2014/main" id="{779A965B-89FA-F044-A3AA-A3D5161AC0D7}"/>
+              </a:ext>
+            </a:extLst>
+          </p:cNvPr>
+          <p:cNvPicPr>
+            <a:picLocks noChangeAspect="1"/>
+          </p:cNvPicPr>
+          <p:nvPr/>
+        </p:nvPicPr>
+        <p:blipFill rotWithShape="1">
+          <a:blip r:embed="rId4"/>
+          <a:srcRect l="5140" t="3149" r="9315" b="2708"/>
+          <a:stretch/>
+        </p:blipFill>
+        <p:spPr>
+          <a:xfrm>
+            <a:off x="272956" y="382556"/>
+            <a:ext cx="6370560" cy="5842259"/>
+          </a:xfrm>
+          <a:prstGeom prst="rect">
+            <a:avLst/>
+          </a:prstGeom>
+        </p:spPr>
+      </p:pic>
+      <p:sp>
+        <p:nvSpPr>
+          <p:cNvPr id="31" name="Rectangle 30">
+            <a:extLst>
+              <a:ext uri="{FF2B5EF4-FFF2-40B4-BE49-F238E27FC236}">
+                <a16:creationId xmlns:a16="http://schemas.microsoft.com/office/drawing/2014/main" id="{028B0D8F-17D0-1941-A1E4-09FA37F5215E}"/>
               </a:ext>
             </a:extLst>
           </p:cNvPr>
@@ -5095,13 +4107,12 @@
         </p:nvSpPr>
         <p:spPr>
           <a:xfrm>
-            <a:off x="3334405" y="230835"/>
-            <a:ext cx="567784" cy="461665"/>
+            <a:off x="84139" y="18223"/>
+            <a:ext cx="389850" cy="461665"/>
           </a:xfrm>
           <a:prstGeom prst="rect">
             <a:avLst/>
           </a:prstGeom>
-          <a:noFill/>
         </p:spPr>
         <p:txBody>
           <a:bodyPr wrap="none">
@@ -5110,36 +4121,21 @@
           <a:lstStyle/>
           <a:p>
             <a:r>
-              <a:rPr lang="en-US" sz="1200" dirty="0">
-                <a:solidFill>
-                  <a:srgbClr val="CB4335"/>
-                </a:solidFill>
+              <a:rPr lang="en-US" sz="2400" dirty="0">
                 <a:latin typeface="Arial" panose="020B0604020202020204" pitchFamily="34" charset="0"/>
                 <a:cs typeface="Arial" panose="020B0604020202020204" pitchFamily="34" charset="0"/>
               </a:rPr>
-              <a:t>0.331</a:t>
-            </a:r>
-          </a:p>
-          <a:p>
-            <a:r>
-              <a:rPr lang="en-US" sz="1200" dirty="0">
-                <a:solidFill>
-                  <a:srgbClr val="FF9A00"/>
-                </a:solidFill>
-                <a:latin typeface="Arial" panose="020B0604020202020204" pitchFamily="34" charset="0"/>
-                <a:cs typeface="Arial" panose="020B0604020202020204" pitchFamily="34" charset="0"/>
-              </a:rPr>
-              <a:t>0.181</a:t>
-            </a:r>
-          </a:p>
-        </p:txBody>
-      </p:sp>
-      <p:sp>
-        <p:nvSpPr>
-          <p:cNvPr id="75" name="Rectangle 74">
+              <a:t>A</a:t>
+            </a:r>
+          </a:p>
+        </p:txBody>
+      </p:sp>
+      <p:sp>
+        <p:nvSpPr>
+          <p:cNvPr id="32" name="Rectangle 31">
             <a:extLst>
               <a:ext uri="{FF2B5EF4-FFF2-40B4-BE49-F238E27FC236}">
-                <a16:creationId xmlns:a16="http://schemas.microsoft.com/office/drawing/2014/main" id="{8DC66D75-D899-2F4B-A9D8-783E4FFC13C1}"/>
+                <a16:creationId xmlns:a16="http://schemas.microsoft.com/office/drawing/2014/main" id="{159AA14E-0BB6-7E4C-9B25-628057BD119B}"/>
               </a:ext>
             </a:extLst>
           </p:cNvPr>
@@ -5148,13 +4144,12 @@
         </p:nvSpPr>
         <p:spPr>
           <a:xfrm>
-            <a:off x="5578991" y="230835"/>
-            <a:ext cx="567784" cy="461665"/>
+            <a:off x="6673795" y="4575"/>
+            <a:ext cx="389850" cy="461665"/>
           </a:xfrm>
           <a:prstGeom prst="rect">
             <a:avLst/>
           </a:prstGeom>
-          <a:noFill/>
         </p:spPr>
         <p:txBody>
           <a:bodyPr wrap="none">
@@ -5163,36 +4158,21 @@
           <a:lstStyle/>
           <a:p>
             <a:r>
-              <a:rPr lang="en-US" sz="1200" dirty="0">
-                <a:solidFill>
-                  <a:srgbClr val="CB4335"/>
-                </a:solidFill>
+              <a:rPr lang="en-US" sz="2400" dirty="0">
                 <a:latin typeface="Arial" panose="020B0604020202020204" pitchFamily="34" charset="0"/>
                 <a:cs typeface="Arial" panose="020B0604020202020204" pitchFamily="34" charset="0"/>
               </a:rPr>
-              <a:t>0.096</a:t>
-            </a:r>
-          </a:p>
-          <a:p>
-            <a:r>
-              <a:rPr lang="en-US" sz="1200" dirty="0">
-                <a:solidFill>
-                  <a:srgbClr val="FF9A00"/>
-                </a:solidFill>
-                <a:latin typeface="Arial" panose="020B0604020202020204" pitchFamily="34" charset="0"/>
-                <a:cs typeface="Arial" panose="020B0604020202020204" pitchFamily="34" charset="0"/>
-              </a:rPr>
-              <a:t>0.077</a:t>
-            </a:r>
-          </a:p>
-        </p:txBody>
-      </p:sp>
-      <p:sp>
-        <p:nvSpPr>
-          <p:cNvPr id="76" name="Rectangle 75">
+              <a:t>B</a:t>
+            </a:r>
+          </a:p>
+        </p:txBody>
+      </p:sp>
+      <p:sp>
+        <p:nvSpPr>
+          <p:cNvPr id="33" name="Rectangle 32">
             <a:extLst>
               <a:ext uri="{FF2B5EF4-FFF2-40B4-BE49-F238E27FC236}">
-                <a16:creationId xmlns:a16="http://schemas.microsoft.com/office/drawing/2014/main" id="{7166B1A5-F580-714C-8E6F-EB9C1D653B36}"/>
+                <a16:creationId xmlns:a16="http://schemas.microsoft.com/office/drawing/2014/main" id="{A57107E1-7C56-8D46-BE77-17C1C260E2F7}"/>
               </a:ext>
             </a:extLst>
           </p:cNvPr>
@@ -5200,14 +4180,13 @@
           <p:nvPr/>
         </p:nvSpPr>
         <p:spPr>
-          <a:xfrm>
-            <a:off x="3328068" y="3563250"/>
-            <a:ext cx="567784" cy="461665"/>
+          <a:xfrm rot="16200000">
+            <a:off x="-1264904" y="2572474"/>
+            <a:ext cx="2752677" cy="307777"/>
           </a:xfrm>
           <a:prstGeom prst="rect">
             <a:avLst/>
           </a:prstGeom>
-          <a:noFill/>
         </p:spPr>
         <p:txBody>
           <a:bodyPr wrap="none">
@@ -5216,36 +4195,91 @@
           <a:lstStyle/>
           <a:p>
             <a:r>
-              <a:rPr lang="en-US" sz="1200" dirty="0">
-                <a:solidFill>
-                  <a:srgbClr val="7C5295"/>
-                </a:solidFill>
+              <a:rPr lang="en-US" sz="1400" dirty="0">
                 <a:latin typeface="Arial" panose="020B0604020202020204" pitchFamily="34" charset="0"/>
                 <a:cs typeface="Arial" panose="020B0604020202020204" pitchFamily="34" charset="0"/>
               </a:rPr>
-              <a:t>0.158</a:t>
-            </a:r>
-          </a:p>
+              <a:t>Amino acid substitutions per site</a:t>
+            </a:r>
+          </a:p>
+        </p:txBody>
+      </p:sp>
+      <p:sp>
+        <p:nvSpPr>
+          <p:cNvPr id="35" name="TextBox 34">
+            <a:extLst>
+              <a:ext uri="{FF2B5EF4-FFF2-40B4-BE49-F238E27FC236}">
+                <a16:creationId xmlns:a16="http://schemas.microsoft.com/office/drawing/2014/main" id="{196BE6B7-9407-A34E-999E-66723CA8A74A}"/>
+              </a:ext>
+            </a:extLst>
+          </p:cNvPr>
+          <p:cNvSpPr txBox="1"/>
+          <p:nvPr/>
+        </p:nvSpPr>
+        <p:spPr>
+          <a:xfrm>
+            <a:off x="5655020" y="556160"/>
+            <a:ext cx="1030603" cy="646331"/>
+          </a:xfrm>
+          <a:prstGeom prst="rect">
+            <a:avLst/>
+          </a:prstGeom>
+          <a:solidFill>
+            <a:schemeClr val="bg1"/>
+          </a:solidFill>
+          <a:ln w="15875" cap="rnd">
+            <a:solidFill>
+              <a:srgbClr val="D6D6D6"/>
+            </a:solidFill>
+          </a:ln>
+        </p:spPr>
+        <p:txBody>
+          <a:bodyPr wrap="none" rtlCol="0">
+            <a:spAutoFit/>
+          </a:bodyPr>
+          <a:lstStyle/>
           <a:p>
             <a:r>
               <a:rPr lang="en-US" sz="1200" dirty="0">
-                <a:solidFill>
-                  <a:srgbClr val="B491CA"/>
-                </a:solidFill>
                 <a:latin typeface="Arial" panose="020B0604020202020204" pitchFamily="34" charset="0"/>
                 <a:cs typeface="Arial" panose="020B0604020202020204" pitchFamily="34" charset="0"/>
               </a:rPr>
-              <a:t>0.478</a:t>
-            </a:r>
-          </a:p>
-        </p:txBody>
-      </p:sp>
-      <p:sp>
-        <p:nvSpPr>
-          <p:cNvPr id="77" name="Rectangle 76">
+              <a:t>     </a:t>
+            </a:r>
+            <a:r>
+              <a:rPr lang="en-US" sz="1200" b="1" dirty="0">
+                <a:latin typeface="Arial" panose="020B0604020202020204" pitchFamily="34" charset="0"/>
+                <a:cs typeface="Arial" panose="020B0604020202020204" pitchFamily="34" charset="0"/>
+              </a:rPr>
+              <a:t>OC43</a:t>
+            </a:r>
+          </a:p>
+          <a:p>
+            <a:r>
+              <a:rPr lang="en-US" sz="1200" dirty="0">
+                <a:latin typeface="Arial" panose="020B0604020202020204" pitchFamily="34" charset="0"/>
+                <a:cs typeface="Arial" panose="020B0604020202020204" pitchFamily="34" charset="0"/>
+              </a:rPr>
+              <a:t>     lineage A</a:t>
+            </a:r>
+          </a:p>
+          <a:p>
+            <a:r>
+              <a:rPr lang="en-US" sz="1200" dirty="0">
+                <a:latin typeface="Arial" panose="020B0604020202020204" pitchFamily="34" charset="0"/>
+                <a:cs typeface="Arial" panose="020B0604020202020204" pitchFamily="34" charset="0"/>
+              </a:rPr>
+              <a:t>     lineage B</a:t>
+            </a:r>
+          </a:p>
+        </p:txBody>
+      </p:sp>
+      <p:sp>
+        <p:nvSpPr>
+          <p:cNvPr id="36" name="Oval 35">
             <a:extLst>
               <a:ext uri="{FF2B5EF4-FFF2-40B4-BE49-F238E27FC236}">
-                <a16:creationId xmlns:a16="http://schemas.microsoft.com/office/drawing/2014/main" id="{0D7FC6FD-3BAF-5040-8FEA-8D6E9B5DD218}"/>
+                <a16:creationId xmlns:a16="http://schemas.microsoft.com/office/drawing/2014/main" id="{623E61AA-99FC-3040-A9F4-0FF33374D30A}"/>
               </a:ext>
             </a:extLst>
           </p:cNvPr>
@@ -5254,51 +4288,55 @@
         </p:nvSpPr>
         <p:spPr>
           <a:xfrm>
-            <a:off x="5589588" y="3563250"/>
-            <a:ext cx="567784" cy="461665"/>
+            <a:off x="5733615" y="794597"/>
+            <a:ext cx="146304" cy="146304"/>
           </a:xfrm>
-          <a:prstGeom prst="rect">
+          <a:prstGeom prst="ellipse">
             <a:avLst/>
           </a:prstGeom>
-          <a:noFill/>
+          <a:solidFill>
+            <a:srgbClr val="CB4335"/>
+          </a:solidFill>
+          <a:ln>
+            <a:noFill/>
+          </a:ln>
         </p:spPr>
-        <p:txBody>
-          <a:bodyPr wrap="none">
-            <a:spAutoFit/>
+        <p:style>
+          <a:lnRef idx="2">
+            <a:schemeClr val="accent1">
+              <a:shade val="50000"/>
+            </a:schemeClr>
+          </a:lnRef>
+          <a:fillRef idx="1">
+            <a:schemeClr val="accent1"/>
+          </a:fillRef>
+          <a:effectRef idx="0">
+            <a:schemeClr val="accent1"/>
+          </a:effectRef>
+          <a:fontRef idx="minor">
+            <a:schemeClr val="lt1"/>
+          </a:fontRef>
+        </p:style>
+        <p:txBody>
+          <a:bodyPr rot="0" spcFirstLastPara="0" vertOverflow="overflow" horzOverflow="overflow" vert="horz" wrap="square" lIns="91440" tIns="45720" rIns="91440" bIns="45720" numCol="1" spcCol="0" rtlCol="0" fromWordArt="0" anchor="ctr" anchorCtr="0" forceAA="0" compatLnSpc="1">
+            <a:prstTxWarp prst="textNoShape">
+              <a:avLst/>
+            </a:prstTxWarp>
+            <a:noAutofit/>
           </a:bodyPr>
           <a:lstStyle/>
           <a:p>
-            <a:r>
-              <a:rPr lang="en-US" sz="1200" dirty="0">
-                <a:solidFill>
-                  <a:srgbClr val="7C5295"/>
-                </a:solidFill>
-                <a:latin typeface="Arial" panose="020B0604020202020204" pitchFamily="34" charset="0"/>
-                <a:cs typeface="Arial" panose="020B0604020202020204" pitchFamily="34" charset="0"/>
-              </a:rPr>
-              <a:t>0.076</a:t>
-            </a:r>
-          </a:p>
-          <a:p>
-            <a:r>
-              <a:rPr lang="en-US" sz="1200" dirty="0">
-                <a:solidFill>
-                  <a:srgbClr val="B491CA"/>
-                </a:solidFill>
-                <a:latin typeface="Arial" panose="020B0604020202020204" pitchFamily="34" charset="0"/>
-                <a:cs typeface="Arial" panose="020B0604020202020204" pitchFamily="34" charset="0"/>
-              </a:rPr>
-              <a:t>0.305</a:t>
-            </a:r>
-          </a:p>
-        </p:txBody>
-      </p:sp>
-      <p:sp>
-        <p:nvSpPr>
-          <p:cNvPr id="78" name="Rectangle 77">
+            <a:pPr algn="ctr"/>
+            <a:endParaRPr lang="en-US"/>
+          </a:p>
+        </p:txBody>
+      </p:sp>
+      <p:sp>
+        <p:nvSpPr>
+          <p:cNvPr id="37" name="Oval 36">
             <a:extLst>
               <a:ext uri="{FF2B5EF4-FFF2-40B4-BE49-F238E27FC236}">
-                <a16:creationId xmlns:a16="http://schemas.microsoft.com/office/drawing/2014/main" id="{A8349822-9C08-A244-A13C-385A1652D6E7}"/>
+                <a16:creationId xmlns:a16="http://schemas.microsoft.com/office/drawing/2014/main" id="{7A831FDD-5EF6-0A4A-A59D-4BB38979463B}"/>
               </a:ext>
             </a:extLst>
           </p:cNvPr>
@@ -5307,51 +4345,107 @@
         </p:nvSpPr>
         <p:spPr>
           <a:xfrm>
-            <a:off x="3295386" y="5208431"/>
-            <a:ext cx="567784" cy="461665"/>
+            <a:off x="5733615" y="985978"/>
+            <a:ext cx="146304" cy="146304"/>
+          </a:xfrm>
+          <a:prstGeom prst="ellipse">
+            <a:avLst/>
+          </a:prstGeom>
+          <a:solidFill>
+            <a:srgbClr val="FF9A00"/>
+          </a:solidFill>
+          <a:ln>
+            <a:noFill/>
+          </a:ln>
+        </p:spPr>
+        <p:style>
+          <a:lnRef idx="2">
+            <a:schemeClr val="accent1">
+              <a:shade val="50000"/>
+            </a:schemeClr>
+          </a:lnRef>
+          <a:fillRef idx="1">
+            <a:schemeClr val="accent1"/>
+          </a:fillRef>
+          <a:effectRef idx="0">
+            <a:schemeClr val="accent1"/>
+          </a:effectRef>
+          <a:fontRef idx="minor">
+            <a:schemeClr val="lt1"/>
+          </a:fontRef>
+        </p:style>
+        <p:txBody>
+          <a:bodyPr rot="0" spcFirstLastPara="0" vertOverflow="overflow" horzOverflow="overflow" vert="horz" wrap="square" lIns="91440" tIns="45720" rIns="91440" bIns="45720" numCol="1" spcCol="0" rtlCol="0" fromWordArt="0" anchor="ctr" anchorCtr="0" forceAA="0" compatLnSpc="1">
+            <a:prstTxWarp prst="textNoShape">
+              <a:avLst/>
+            </a:prstTxWarp>
+            <a:noAutofit/>
+          </a:bodyPr>
+          <a:lstStyle/>
+          <a:p>
+            <a:pPr algn="ctr"/>
+            <a:endParaRPr lang="en-US"/>
+          </a:p>
+        </p:txBody>
+      </p:sp>
+      <p:sp>
+        <p:nvSpPr>
+          <p:cNvPr id="38" name="TextBox 37">
+            <a:extLst>
+              <a:ext uri="{FF2B5EF4-FFF2-40B4-BE49-F238E27FC236}">
+                <a16:creationId xmlns:a16="http://schemas.microsoft.com/office/drawing/2014/main" id="{D1A7CD29-A61D-2E44-BAF7-5522F659EEC9}"/>
+              </a:ext>
+            </a:extLst>
+          </p:cNvPr>
+          <p:cNvSpPr txBox="1"/>
+          <p:nvPr/>
+        </p:nvSpPr>
+        <p:spPr>
+          <a:xfrm>
+            <a:off x="5927082" y="3561169"/>
+            <a:ext cx="758541" cy="276999"/>
           </a:xfrm>
           <a:prstGeom prst="rect">
             <a:avLst/>
           </a:prstGeom>
-          <a:noFill/>
+          <a:solidFill>
+            <a:schemeClr val="bg1"/>
+          </a:solidFill>
+          <a:ln w="15875" cap="rnd">
+            <a:solidFill>
+              <a:srgbClr val="D6D6D6"/>
+            </a:solidFill>
+          </a:ln>
         </p:spPr>
         <p:txBody>
-          <a:bodyPr wrap="none">
+          <a:bodyPr wrap="none" rtlCol="0">
             <a:spAutoFit/>
           </a:bodyPr>
           <a:lstStyle/>
           <a:p>
             <a:r>
               <a:rPr lang="en-US" sz="1200" dirty="0">
-                <a:solidFill>
-                  <a:srgbClr val="009888"/>
-                </a:solidFill>
                 <a:latin typeface="Arial" panose="020B0604020202020204" pitchFamily="34" charset="0"/>
                 <a:cs typeface="Arial" panose="020B0604020202020204" pitchFamily="34" charset="0"/>
               </a:rPr>
-              <a:t>0.087</a:t>
-            </a:r>
-          </a:p>
-          <a:p>
-            <a:r>
-              <a:rPr lang="en-US" sz="1200" dirty="0">
-                <a:solidFill>
-                  <a:srgbClr val="87C735"/>
-                </a:solidFill>
+              <a:t>     </a:t>
+            </a:r>
+            <a:r>
+              <a:rPr lang="en-US" sz="1200" b="1" dirty="0">
                 <a:latin typeface="Arial" panose="020B0604020202020204" pitchFamily="34" charset="0"/>
                 <a:cs typeface="Arial" panose="020B0604020202020204" pitchFamily="34" charset="0"/>
               </a:rPr>
-              <a:t>0.072</a:t>
-            </a:r>
-          </a:p>
-        </p:txBody>
-      </p:sp>
-      <p:sp>
-        <p:nvSpPr>
-          <p:cNvPr id="79" name="Rectangle 78">
+              <a:t>229E</a:t>
+            </a:r>
+          </a:p>
+        </p:txBody>
+      </p:sp>
+      <p:sp>
+        <p:nvSpPr>
+          <p:cNvPr id="39" name="Oval 38">
             <a:extLst>
               <a:ext uri="{FF2B5EF4-FFF2-40B4-BE49-F238E27FC236}">
-                <a16:creationId xmlns:a16="http://schemas.microsoft.com/office/drawing/2014/main" id="{BACD3EA2-1A07-AB48-8FB4-7ED89E97FC1C}"/>
+                <a16:creationId xmlns:a16="http://schemas.microsoft.com/office/drawing/2014/main" id="{000563B3-641B-654B-8DB2-1EFF3DAC15DE}"/>
               </a:ext>
             </a:extLst>
           </p:cNvPr>
@@ -5360,51 +4454,55 @@
         </p:nvSpPr>
         <p:spPr>
           <a:xfrm>
-            <a:off x="5582307" y="5208431"/>
-            <a:ext cx="567784" cy="461665"/>
+            <a:off x="6005677" y="3627330"/>
+            <a:ext cx="146304" cy="146304"/>
           </a:xfrm>
-          <a:prstGeom prst="rect">
+          <a:prstGeom prst="ellipse">
             <a:avLst/>
           </a:prstGeom>
-          <a:noFill/>
+          <a:solidFill>
+            <a:srgbClr val="2E86C1"/>
+          </a:solidFill>
+          <a:ln>
+            <a:noFill/>
+          </a:ln>
         </p:spPr>
-        <p:txBody>
-          <a:bodyPr wrap="none">
-            <a:spAutoFit/>
+        <p:style>
+          <a:lnRef idx="2">
+            <a:schemeClr val="accent1">
+              <a:shade val="50000"/>
+            </a:schemeClr>
+          </a:lnRef>
+          <a:fillRef idx="1">
+            <a:schemeClr val="accent1"/>
+          </a:fillRef>
+          <a:effectRef idx="0">
+            <a:schemeClr val="accent1"/>
+          </a:effectRef>
+          <a:fontRef idx="minor">
+            <a:schemeClr val="lt1"/>
+          </a:fontRef>
+        </p:style>
+        <p:txBody>
+          <a:bodyPr rot="0" spcFirstLastPara="0" vertOverflow="overflow" horzOverflow="overflow" vert="horz" wrap="square" lIns="91440" tIns="45720" rIns="91440" bIns="45720" numCol="1" spcCol="0" rtlCol="0" fromWordArt="0" anchor="ctr" anchorCtr="0" forceAA="0" compatLnSpc="1">
+            <a:prstTxWarp prst="textNoShape">
+              <a:avLst/>
+            </a:prstTxWarp>
+            <a:noAutofit/>
           </a:bodyPr>
           <a:lstStyle/>
           <a:p>
-            <a:r>
-              <a:rPr lang="en-US" sz="1200" dirty="0">
-                <a:solidFill>
-                  <a:srgbClr val="009888"/>
-                </a:solidFill>
-                <a:latin typeface="Arial" panose="020B0604020202020204" pitchFamily="34" charset="0"/>
-                <a:cs typeface="Arial" panose="020B0604020202020204" pitchFamily="34" charset="0"/>
-              </a:rPr>
-              <a:t>0.048</a:t>
-            </a:r>
-          </a:p>
-          <a:p>
-            <a:r>
-              <a:rPr lang="en-US" sz="1200" dirty="0">
-                <a:solidFill>
-                  <a:srgbClr val="87C735"/>
-                </a:solidFill>
-                <a:latin typeface="Arial" panose="020B0604020202020204" pitchFamily="34" charset="0"/>
-                <a:cs typeface="Arial" panose="020B0604020202020204" pitchFamily="34" charset="0"/>
-              </a:rPr>
-              <a:t>0.033</a:t>
-            </a:r>
-          </a:p>
-        </p:txBody>
-      </p:sp>
-      <p:sp>
-        <p:nvSpPr>
-          <p:cNvPr id="80" name="Rectangle 79">
+            <a:pPr algn="ctr"/>
+            <a:endParaRPr lang="en-US"/>
+          </a:p>
+        </p:txBody>
+      </p:sp>
+      <p:sp>
+        <p:nvSpPr>
+          <p:cNvPr id="40" name="Rectangle 39">
             <a:extLst>
               <a:ext uri="{FF2B5EF4-FFF2-40B4-BE49-F238E27FC236}">
-                <a16:creationId xmlns:a16="http://schemas.microsoft.com/office/drawing/2014/main" id="{6B0DC577-9C9A-6F48-BBD6-CC883D96ED17}"/>
+                <a16:creationId xmlns:a16="http://schemas.microsoft.com/office/drawing/2014/main" id="{D8DB164B-CCCA-C648-90DF-B0BA857DD89B}"/>
               </a:ext>
             </a:extLst>
           </p:cNvPr>
@@ -5413,13 +4511,12 @@
         </p:nvSpPr>
         <p:spPr>
           <a:xfrm>
-            <a:off x="2931426" y="1895120"/>
-            <a:ext cx="567784" cy="276999"/>
+            <a:off x="2350401" y="6172186"/>
+            <a:ext cx="2215671" cy="307777"/>
           </a:xfrm>
           <a:prstGeom prst="rect">
             <a:avLst/>
           </a:prstGeom>
-          <a:noFill/>
         </p:spPr>
         <p:txBody>
           <a:bodyPr wrap="none">
@@ -5428,55 +4525,11 @@
           <a:lstStyle/>
           <a:p>
             <a:r>
-              <a:rPr lang="en-US" sz="1200" dirty="0">
-                <a:solidFill>
-                  <a:srgbClr val="2E86C1"/>
-                </a:solidFill>
+              <a:rPr lang="en-US" sz="1400" dirty="0">
                 <a:latin typeface="Arial" panose="020B0604020202020204" pitchFamily="34" charset="0"/>
                 <a:cs typeface="Arial" panose="020B0604020202020204" pitchFamily="34" charset="0"/>
               </a:rPr>
-              <a:t>0.170</a:t>
-            </a:r>
-          </a:p>
-        </p:txBody>
-      </p:sp>
-      <p:sp>
-        <p:nvSpPr>
-          <p:cNvPr id="81" name="Rectangle 80">
-            <a:extLst>
-              <a:ext uri="{FF2B5EF4-FFF2-40B4-BE49-F238E27FC236}">
-                <a16:creationId xmlns:a16="http://schemas.microsoft.com/office/drawing/2014/main" id="{EF3BA3EE-F095-F14C-8DCA-1D74AD2CE99F}"/>
-              </a:ext>
-            </a:extLst>
-          </p:cNvPr>
-          <p:cNvSpPr/>
-          <p:nvPr/>
-        </p:nvSpPr>
-        <p:spPr>
-          <a:xfrm>
-            <a:off x="5589588" y="1895120"/>
-            <a:ext cx="567784" cy="276999"/>
-          </a:xfrm>
-          <a:prstGeom prst="rect">
-            <a:avLst/>
-          </a:prstGeom>
-          <a:noFill/>
-        </p:spPr>
-        <p:txBody>
-          <a:bodyPr wrap="none">
-            <a:spAutoFit/>
-          </a:bodyPr>
-          <a:lstStyle/>
-          <a:p>
-            <a:r>
-              <a:rPr lang="en-US" sz="1200" dirty="0">
-                <a:solidFill>
-                  <a:srgbClr val="2E86C1"/>
-                </a:solidFill>
-                <a:latin typeface="Arial" panose="020B0604020202020204" pitchFamily="34" charset="0"/>
-                <a:cs typeface="Arial" panose="020B0604020202020204" pitchFamily="34" charset="0"/>
-              </a:rPr>
-              <a:t>0.033</a:t>
+              <a:t>Spike amino acid position</a:t>
             </a:r>
           </a:p>
         </p:txBody>
@@ -5484,7 +4537,7 @@
     </p:spTree>
     <p:extLst>
       <p:ext uri="{BB962C8B-B14F-4D97-AF65-F5344CB8AC3E}">
-        <p14:creationId xmlns:p14="http://schemas.microsoft.com/office/powerpoint/2010/main" val="586394769"/>
+        <p14:creationId xmlns:p14="http://schemas.microsoft.com/office/powerpoint/2010/main" val="3223370521"/>
       </p:ext>
     </p:extLst>
   </p:cSld>

</xml_diff>